<commit_message>
A few image tweaks
* simplified untrusted part
* different color for (non-enclave) FPC stuff vs standard Fabric
* fixed flows (numbering, some missing steps, format)

Signed-off-by: Michael Steiner <michael.steiner@intel.com>
</commit_message>
<xml_diff>
--- a/images/fpc/high-level/hl-diagrams.pptx
+++ b/images/fpc/high-level/hl-diagrams.pptx
@@ -272,7 +272,7 @@
             <a:fld id="{B39099E1-2F6C-1143-9DF8-8ECBCD01D041}" type="datetimeFigureOut">
               <a:rPr lang="en-US" smtClean="0"/>
               <a:pPr/>
-              <a:t>11/18/20</a:t>
+              <a:t>2020-11-18</a:t>
             </a:fld>
             <a:endParaRPr lang="en-US"/>
           </a:p>
@@ -6647,7 +6647,7 @@
             <a:avLst/>
           </a:prstGeom>
           <a:solidFill>
-            <a:schemeClr val="tx1"/>
+            <a:schemeClr val="bg2"/>
           </a:solidFill>
           <a:ln w="25400"/>
           <a:effectLst>
@@ -6773,7 +6773,7 @@
             <a:avLst/>
           </a:prstGeom>
           <a:solidFill>
-            <a:schemeClr val="tx1"/>
+            <a:schemeClr val="bg2"/>
           </a:solidFill>
           <a:ln w="25400"/>
           <a:effectLst>
@@ -7285,7 +7285,7 @@
               <p:nvPr/>
             </p:nvPicPr>
             <p:blipFill>
-              <a:blip r:embed="rId5">
+              <a:blip r:embed="rId5" cstate="print">
                 <a:extLst>
                   <a:ext uri="{28A0092B-C50C-407E-A947-70E740481C1C}">
                     <a14:useLocalDpi xmlns:a14="http://schemas.microsoft.com/office/drawing/2010/main" val="0"/>
@@ -7326,7 +7326,7 @@
           <p:nvPr/>
         </p:nvPicPr>
         <p:blipFill>
-          <a:blip r:embed="rId7">
+          <a:blip r:embed="rId7" cstate="print">
             <a:extLst>
               <a:ext uri="{28A0092B-C50C-407E-A947-70E740481C1C}">
                 <a14:useLocalDpi xmlns:a14="http://schemas.microsoft.com/office/drawing/2010/main" val="0"/>
@@ -7365,7 +7365,7 @@
           <p:nvPr/>
         </p:nvPicPr>
         <p:blipFill>
-          <a:blip r:embed="rId5">
+          <a:blip r:embed="rId5" cstate="print">
             <a:extLst>
               <a:ext uri="{28A0092B-C50C-407E-A947-70E740481C1C}">
                 <a14:useLocalDpi xmlns:a14="http://schemas.microsoft.com/office/drawing/2010/main" val="0"/>
@@ -7937,7 +7937,7 @@
             <a:avLst/>
           </a:prstGeom>
           <a:solidFill>
-            <a:schemeClr val="tx1"/>
+            <a:schemeClr val="bg2"/>
           </a:solidFill>
           <a:ln w="25400"/>
           <a:effectLst>
@@ -8000,7 +8000,10 @@
             <a:avLst/>
           </a:prstGeom>
           <a:solidFill>
-            <a:schemeClr val="tx1"/>
+            <a:schemeClr val="accent4">
+              <a:lumMod val="40000"/>
+              <a:lumOff val="60000"/>
+            </a:schemeClr>
           </a:solidFill>
           <a:ln w="25400"/>
           <a:effectLst>
@@ -8254,13 +8257,13 @@
         <p:spPr>
           <a:xfrm>
             <a:off x="4426751" y="2468170"/>
-            <a:ext cx="795910" cy="316777"/>
+            <a:ext cx="795910" cy="1145204"/>
           </a:xfrm>
           <a:prstGeom prst="rect">
             <a:avLst/>
           </a:prstGeom>
           <a:solidFill>
-            <a:schemeClr val="tx1"/>
+            <a:schemeClr val="bg2"/>
           </a:solidFill>
           <a:ln w="25400"/>
           <a:effectLst>
@@ -8304,10 +8307,10 @@
       </p:sp>
       <p:sp>
         <p:nvSpPr>
-          <p:cNvPr id="45" name="Rectangle 44">
+          <p:cNvPr id="46" name="Rectangle 45">
             <a:extLst>
               <a:ext uri="{FF2B5EF4-FFF2-40B4-BE49-F238E27FC236}">
-                <a16:creationId xmlns:a16="http://schemas.microsoft.com/office/drawing/2014/main" id="{D277D9A1-D43F-764A-AE04-174DB2F97071}"/>
+                <a16:creationId xmlns:a16="http://schemas.microsoft.com/office/drawing/2014/main" id="{BEB84A8F-5A5D-8C48-8BED-0ED364AC54AE}"/>
               </a:ext>
             </a:extLst>
           </p:cNvPr>
@@ -8316,14 +8319,14 @@
         </p:nvSpPr>
         <p:spPr>
           <a:xfrm>
-            <a:off x="4426751" y="2886151"/>
-            <a:ext cx="795910" cy="697331"/>
+            <a:off x="5453925" y="3293390"/>
+            <a:ext cx="1044760" cy="440066"/>
           </a:xfrm>
           <a:prstGeom prst="rect">
             <a:avLst/>
           </a:prstGeom>
           <a:solidFill>
-            <a:schemeClr val="tx1"/>
+            <a:schemeClr val="bg2"/>
           </a:solidFill>
           <a:ln w="25400"/>
           <a:effectLst>
@@ -8360,76 +8363,6 @@
             <a:pPr algn="ctr"/>
             <a:r>
               <a:rPr lang="en-US" sz="800" dirty="0"/>
-              <a:t>Wrapper</a:t>
-            </a:r>
-            <a:br>
-              <a:rPr lang="en-US" sz="800" dirty="0"/>
-            </a:br>
-            <a:r>
-              <a:rPr lang="en-US" sz="800" dirty="0"/>
-              <a:t>Chaincode</a:t>
-            </a:r>
-          </a:p>
-        </p:txBody>
-      </p:sp>
-      <p:sp>
-        <p:nvSpPr>
-          <p:cNvPr id="46" name="Rectangle 45">
-            <a:extLst>
-              <a:ext uri="{FF2B5EF4-FFF2-40B4-BE49-F238E27FC236}">
-                <a16:creationId xmlns:a16="http://schemas.microsoft.com/office/drawing/2014/main" id="{BEB84A8F-5A5D-8C48-8BED-0ED364AC54AE}"/>
-              </a:ext>
-            </a:extLst>
-          </p:cNvPr>
-          <p:cNvSpPr/>
-          <p:nvPr/>
-        </p:nvSpPr>
-        <p:spPr>
-          <a:xfrm>
-            <a:off x="5453925" y="3293390"/>
-            <a:ext cx="1044760" cy="440066"/>
-          </a:xfrm>
-          <a:prstGeom prst="rect">
-            <a:avLst/>
-          </a:prstGeom>
-          <a:solidFill>
-            <a:schemeClr val="tx1"/>
-          </a:solidFill>
-          <a:ln w="25400"/>
-          <a:effectLst>
-            <a:outerShdw blurRad="50800" dist="38100" dir="2700000" algn="tl" rotWithShape="0">
-              <a:prstClr val="black">
-                <a:alpha val="40000"/>
-              </a:prstClr>
-            </a:outerShdw>
-          </a:effectLst>
-        </p:spPr>
-        <p:style>
-          <a:lnRef idx="3">
-            <a:schemeClr val="lt1"/>
-          </a:lnRef>
-          <a:fillRef idx="1">
-            <a:schemeClr val="dk1"/>
-          </a:fillRef>
-          <a:effectRef idx="1">
-            <a:schemeClr val="dk1"/>
-          </a:effectRef>
-          <a:fontRef idx="minor">
-            <a:schemeClr val="lt1"/>
-          </a:fontRef>
-        </p:style>
-        <p:txBody>
-          <a:bodyPr rot="0" spcFirstLastPara="0" vertOverflow="overflow" horzOverflow="overflow" vert="horz" wrap="square" lIns="72000" tIns="72000" rIns="68580" bIns="34290" numCol="1" spcCol="0" rtlCol="0" fromWordArt="0" anchor="ctr" anchorCtr="0" forceAA="0" compatLnSpc="1">
-            <a:prstTxWarp prst="textNoShape">
-              <a:avLst/>
-            </a:prstTxWarp>
-            <a:noAutofit/>
-          </a:bodyPr>
-          <a:lstStyle/>
-          <a:p>
-            <a:pPr algn="ctr"/>
-            <a:r>
-              <a:rPr lang="en-US" sz="800" dirty="0"/>
               <a:t>Enclave Endorsement Validation</a:t>
             </a:r>
           </a:p>
@@ -8446,15 +8379,14 @@
           </p:cNvPr>
           <p:cNvCxnSpPr>
             <a:cxnSpLocks/>
-            <a:stCxn id="44" idx="3"/>
             <a:endCxn id="33" idx="1"/>
           </p:cNvCxnSpPr>
           <p:nvPr/>
         </p:nvCxnSpPr>
         <p:spPr bwMode="auto">
-          <a:xfrm>
-            <a:off x="5222661" y="2626559"/>
-            <a:ext cx="296219" cy="151"/>
+          <a:xfrm flipV="1">
+            <a:off x="5222661" y="2626710"/>
+            <a:ext cx="296219" cy="10389"/>
           </a:xfrm>
           <a:prstGeom prst="straightConnector1">
             <a:avLst/>
@@ -8622,7 +8554,6 @@
           <p:cNvCxnSpPr>
             <a:cxnSpLocks/>
             <a:stCxn id="73" idx="3"/>
-            <a:endCxn id="45" idx="1"/>
           </p:cNvCxnSpPr>
           <p:nvPr/>
         </p:nvCxnSpPr>
@@ -9129,7 +9060,7 @@
               <p:nvPr/>
             </p:nvPicPr>
             <p:blipFill>
-              <a:blip r:embed="rId4">
+              <a:blip r:embed="rId4" cstate="print">
                 <a:extLst>
                   <a:ext uri="{28A0092B-C50C-407E-A947-70E740481C1C}">
                     <a14:useLocalDpi xmlns:a14="http://schemas.microsoft.com/office/drawing/2010/main" val="0"/>
@@ -9230,7 +9161,7 @@
               <a:avLst/>
             </a:prstGeom>
             <a:solidFill>
-              <a:schemeClr val="tx1"/>
+              <a:schemeClr val="bg2"/>
             </a:solidFill>
             <a:ln w="25400"/>
             <a:effectLst>
@@ -9300,7 +9231,7 @@
               <a:avLst/>
             </a:prstGeom>
             <a:solidFill>
-              <a:schemeClr val="tx1"/>
+              <a:schemeClr val="bg2"/>
             </a:solidFill>
             <a:ln w="25400"/>
             <a:effectLst>
@@ -9343,51 +9274,6 @@
           </p:txBody>
         </p:sp>
       </p:grpSp>
-      <p:cxnSp>
-        <p:nvCxnSpPr>
-          <p:cNvPr id="86" name="Straight Arrow Connector 85">
-            <a:extLst>
-              <a:ext uri="{FF2B5EF4-FFF2-40B4-BE49-F238E27FC236}">
-                <a16:creationId xmlns:a16="http://schemas.microsoft.com/office/drawing/2014/main" id="{9F07A962-3006-7D44-8E32-A24F6480BCC5}"/>
-              </a:ext>
-            </a:extLst>
-          </p:cNvPr>
-          <p:cNvCxnSpPr>
-            <a:cxnSpLocks/>
-          </p:cNvCxnSpPr>
-          <p:nvPr/>
-        </p:nvCxnSpPr>
-        <p:spPr bwMode="auto">
-          <a:xfrm>
-            <a:off x="5229824" y="3032887"/>
-            <a:ext cx="296219" cy="151"/>
-          </a:xfrm>
-          <a:prstGeom prst="straightConnector1">
-            <a:avLst/>
-          </a:prstGeom>
-          <a:ln w="31750">
-            <a:solidFill>
-              <a:srgbClr val="FFC000"/>
-            </a:solidFill>
-            <a:headEnd type="triangle" w="med" len="med"/>
-            <a:tailEnd type="triangle"/>
-          </a:ln>
-        </p:spPr>
-        <p:style>
-          <a:lnRef idx="1">
-            <a:schemeClr val="accent4"/>
-          </a:lnRef>
-          <a:fillRef idx="0">
-            <a:schemeClr val="accent4"/>
-          </a:fillRef>
-          <a:effectRef idx="0">
-            <a:schemeClr val="accent4"/>
-          </a:effectRef>
-          <a:fontRef idx="minor">
-            <a:schemeClr val="tx1"/>
-          </a:fontRef>
-        </p:style>
-      </p:cxnSp>
       <p:cxnSp>
         <p:nvCxnSpPr>
           <p:cNvPr id="88" name="Straight Arrow Connector 87">
@@ -9970,7 +9856,7 @@
             <a:avLst/>
           </a:prstGeom>
           <a:solidFill>
-            <a:schemeClr val="tx1"/>
+            <a:schemeClr val="bg2"/>
           </a:solidFill>
           <a:ln w="25400"/>
           <a:effectLst>
@@ -10033,7 +9919,7 @@
             <a:avLst/>
           </a:prstGeom>
           <a:solidFill>
-            <a:schemeClr val="tx1"/>
+            <a:schemeClr val="bg2"/>
           </a:solidFill>
           <a:ln w="25400"/>
           <a:effectLst>
@@ -10274,10 +10160,10 @@
       </p:grpSp>
       <p:sp>
         <p:nvSpPr>
-          <p:cNvPr id="44" name="Rectangle 43">
+          <p:cNvPr id="46" name="Rectangle 45">
             <a:extLst>
               <a:ext uri="{FF2B5EF4-FFF2-40B4-BE49-F238E27FC236}">
-                <a16:creationId xmlns:a16="http://schemas.microsoft.com/office/drawing/2014/main" id="{254682A9-554F-A347-BFDE-49F7B1A1E46C}"/>
+                <a16:creationId xmlns:a16="http://schemas.microsoft.com/office/drawing/2014/main" id="{BEB84A8F-5A5D-8C48-8BED-0ED364AC54AE}"/>
               </a:ext>
             </a:extLst>
           </p:cNvPr>
@@ -10286,14 +10172,14 @@
         </p:nvSpPr>
         <p:spPr>
           <a:xfrm>
-            <a:off x="4426751" y="2468170"/>
-            <a:ext cx="795910" cy="316777"/>
+            <a:off x="5453925" y="3293390"/>
+            <a:ext cx="1044760" cy="440066"/>
           </a:xfrm>
           <a:prstGeom prst="rect">
             <a:avLst/>
           </a:prstGeom>
           <a:solidFill>
-            <a:schemeClr val="tx1"/>
+            <a:schemeClr val="bg2"/>
           </a:solidFill>
           <a:ln w="25400"/>
           <a:effectLst>
@@ -10330,191 +10216,11 @@
             <a:pPr algn="ctr"/>
             <a:r>
               <a:rPr lang="en-US" sz="800" dirty="0"/>
-              <a:t>Shim</a:t>
+              <a:t>Enclave Endorsement Validation</a:t>
             </a:r>
           </a:p>
         </p:txBody>
       </p:sp>
-      <p:sp>
-        <p:nvSpPr>
-          <p:cNvPr id="45" name="Rectangle 44">
-            <a:extLst>
-              <a:ext uri="{FF2B5EF4-FFF2-40B4-BE49-F238E27FC236}">
-                <a16:creationId xmlns:a16="http://schemas.microsoft.com/office/drawing/2014/main" id="{D277D9A1-D43F-764A-AE04-174DB2F97071}"/>
-              </a:ext>
-            </a:extLst>
-          </p:cNvPr>
-          <p:cNvSpPr/>
-          <p:nvPr/>
-        </p:nvSpPr>
-        <p:spPr>
-          <a:xfrm>
-            <a:off x="4426751" y="2886151"/>
-            <a:ext cx="795910" cy="697331"/>
-          </a:xfrm>
-          <a:prstGeom prst="rect">
-            <a:avLst/>
-          </a:prstGeom>
-          <a:solidFill>
-            <a:schemeClr val="tx1"/>
-          </a:solidFill>
-          <a:ln w="25400"/>
-          <a:effectLst>
-            <a:outerShdw blurRad="50800" dist="38100" dir="2700000" algn="tl" rotWithShape="0">
-              <a:prstClr val="black">
-                <a:alpha val="40000"/>
-              </a:prstClr>
-            </a:outerShdw>
-          </a:effectLst>
-        </p:spPr>
-        <p:style>
-          <a:lnRef idx="3">
-            <a:schemeClr val="lt1"/>
-          </a:lnRef>
-          <a:fillRef idx="1">
-            <a:schemeClr val="dk1"/>
-          </a:fillRef>
-          <a:effectRef idx="1">
-            <a:schemeClr val="dk1"/>
-          </a:effectRef>
-          <a:fontRef idx="minor">
-            <a:schemeClr val="lt1"/>
-          </a:fontRef>
-        </p:style>
-        <p:txBody>
-          <a:bodyPr rot="0" spcFirstLastPara="0" vertOverflow="overflow" horzOverflow="overflow" vert="horz" wrap="square" lIns="72000" tIns="72000" rIns="68580" bIns="34290" numCol="1" spcCol="0" rtlCol="0" fromWordArt="0" anchor="ctr" anchorCtr="0" forceAA="0" compatLnSpc="1">
-            <a:prstTxWarp prst="textNoShape">
-              <a:avLst/>
-            </a:prstTxWarp>
-            <a:noAutofit/>
-          </a:bodyPr>
-          <a:lstStyle/>
-          <a:p>
-            <a:pPr algn="ctr"/>
-            <a:r>
-              <a:rPr lang="en-US" sz="800" dirty="0"/>
-              <a:t>Wrapper</a:t>
-            </a:r>
-            <a:br>
-              <a:rPr lang="en-US" sz="800" dirty="0"/>
-            </a:br>
-            <a:r>
-              <a:rPr lang="en-US" sz="800" dirty="0"/>
-              <a:t>Chaincode</a:t>
-            </a:r>
-          </a:p>
-        </p:txBody>
-      </p:sp>
-      <p:sp>
-        <p:nvSpPr>
-          <p:cNvPr id="46" name="Rectangle 45">
-            <a:extLst>
-              <a:ext uri="{FF2B5EF4-FFF2-40B4-BE49-F238E27FC236}">
-                <a16:creationId xmlns:a16="http://schemas.microsoft.com/office/drawing/2014/main" id="{BEB84A8F-5A5D-8C48-8BED-0ED364AC54AE}"/>
-              </a:ext>
-            </a:extLst>
-          </p:cNvPr>
-          <p:cNvSpPr/>
-          <p:nvPr/>
-        </p:nvSpPr>
-        <p:spPr>
-          <a:xfrm>
-            <a:off x="5453925" y="3293390"/>
-            <a:ext cx="1044760" cy="440066"/>
-          </a:xfrm>
-          <a:prstGeom prst="rect">
-            <a:avLst/>
-          </a:prstGeom>
-          <a:solidFill>
-            <a:schemeClr val="tx1"/>
-          </a:solidFill>
-          <a:ln w="25400"/>
-          <a:effectLst>
-            <a:outerShdw blurRad="50800" dist="38100" dir="2700000" algn="tl" rotWithShape="0">
-              <a:prstClr val="black">
-                <a:alpha val="40000"/>
-              </a:prstClr>
-            </a:outerShdw>
-          </a:effectLst>
-        </p:spPr>
-        <p:style>
-          <a:lnRef idx="3">
-            <a:schemeClr val="lt1"/>
-          </a:lnRef>
-          <a:fillRef idx="1">
-            <a:schemeClr val="dk1"/>
-          </a:fillRef>
-          <a:effectRef idx="1">
-            <a:schemeClr val="dk1"/>
-          </a:effectRef>
-          <a:fontRef idx="minor">
-            <a:schemeClr val="lt1"/>
-          </a:fontRef>
-        </p:style>
-        <p:txBody>
-          <a:bodyPr rot="0" spcFirstLastPara="0" vertOverflow="overflow" horzOverflow="overflow" vert="horz" wrap="square" lIns="72000" tIns="72000" rIns="68580" bIns="34290" numCol="1" spcCol="0" rtlCol="0" fromWordArt="0" anchor="ctr" anchorCtr="0" forceAA="0" compatLnSpc="1">
-            <a:prstTxWarp prst="textNoShape">
-              <a:avLst/>
-            </a:prstTxWarp>
-            <a:noAutofit/>
-          </a:bodyPr>
-          <a:lstStyle/>
-          <a:p>
-            <a:pPr algn="ctr"/>
-            <a:r>
-              <a:rPr lang="en-US" sz="800" dirty="0"/>
-              <a:t>Enclave Endorsement Validation</a:t>
-            </a:r>
-          </a:p>
-        </p:txBody>
-      </p:sp>
-      <p:cxnSp>
-        <p:nvCxnSpPr>
-          <p:cNvPr id="51" name="Straight Arrow Connector 50">
-            <a:extLst>
-              <a:ext uri="{FF2B5EF4-FFF2-40B4-BE49-F238E27FC236}">
-                <a16:creationId xmlns:a16="http://schemas.microsoft.com/office/drawing/2014/main" id="{0BD82215-997C-7346-9587-E4BFD02DF7C0}"/>
-              </a:ext>
-            </a:extLst>
-          </p:cNvPr>
-          <p:cNvCxnSpPr>
-            <a:cxnSpLocks/>
-            <a:stCxn id="44" idx="3"/>
-            <a:endCxn id="33" idx="1"/>
-          </p:cNvCxnSpPr>
-          <p:nvPr/>
-        </p:nvCxnSpPr>
-        <p:spPr bwMode="auto">
-          <a:xfrm>
-            <a:off x="5222661" y="2626559"/>
-            <a:ext cx="296219" cy="151"/>
-          </a:xfrm>
-          <a:prstGeom prst="straightConnector1">
-            <a:avLst/>
-          </a:prstGeom>
-          <a:ln w="31750">
-            <a:solidFill>
-              <a:srgbClr val="FFC000"/>
-            </a:solidFill>
-            <a:headEnd type="triangle" w="med" len="med"/>
-            <a:tailEnd type="triangle"/>
-          </a:ln>
-        </p:spPr>
-        <p:style>
-          <a:lnRef idx="1">
-            <a:schemeClr val="accent4"/>
-          </a:lnRef>
-          <a:fillRef idx="0">
-            <a:schemeClr val="accent4"/>
-          </a:fillRef>
-          <a:effectRef idx="0">
-            <a:schemeClr val="accent4"/>
-          </a:effectRef>
-          <a:fontRef idx="minor">
-            <a:schemeClr val="tx1"/>
-          </a:fontRef>
-        </p:style>
-      </p:cxnSp>
       <p:cxnSp>
         <p:nvCxnSpPr>
           <p:cNvPr id="53" name="Straight Arrow Connector 52">
@@ -10655,7 +10361,6 @@
           <p:cNvCxnSpPr>
             <a:cxnSpLocks/>
             <a:stCxn id="73" idx="3"/>
-            <a:endCxn id="45" idx="1"/>
           </p:cNvCxnSpPr>
           <p:nvPr/>
         </p:nvCxnSpPr>
@@ -11162,7 +10867,7 @@
               <p:nvPr/>
             </p:nvPicPr>
             <p:blipFill>
-              <a:blip r:embed="rId4">
+              <a:blip r:embed="rId4" cstate="print">
                 <a:extLst>
                   <a:ext uri="{28A0092B-C50C-407E-A947-70E740481C1C}">
                     <a14:useLocalDpi xmlns:a14="http://schemas.microsoft.com/office/drawing/2010/main" val="0"/>
@@ -11263,7 +10968,7 @@
               <a:avLst/>
             </a:prstGeom>
             <a:solidFill>
-              <a:schemeClr val="tx1"/>
+              <a:schemeClr val="bg2"/>
             </a:solidFill>
             <a:ln w="25400"/>
             <a:effectLst>
@@ -11333,7 +11038,7 @@
               <a:avLst/>
             </a:prstGeom>
             <a:solidFill>
-              <a:schemeClr val="tx1"/>
+              <a:schemeClr val="bg2"/>
             </a:solidFill>
             <a:ln w="25400"/>
             <a:effectLst>
@@ -11376,96 +11081,6 @@
           </p:txBody>
         </p:sp>
       </p:grpSp>
-      <p:cxnSp>
-        <p:nvCxnSpPr>
-          <p:cNvPr id="86" name="Straight Arrow Connector 85">
-            <a:extLst>
-              <a:ext uri="{FF2B5EF4-FFF2-40B4-BE49-F238E27FC236}">
-                <a16:creationId xmlns:a16="http://schemas.microsoft.com/office/drawing/2014/main" id="{9F07A962-3006-7D44-8E32-A24F6480BCC5}"/>
-              </a:ext>
-            </a:extLst>
-          </p:cNvPr>
-          <p:cNvCxnSpPr>
-            <a:cxnSpLocks/>
-          </p:cNvCxnSpPr>
-          <p:nvPr/>
-        </p:nvCxnSpPr>
-        <p:spPr bwMode="auto">
-          <a:xfrm>
-            <a:off x="5229824" y="3032887"/>
-            <a:ext cx="296219" cy="151"/>
-          </a:xfrm>
-          <a:prstGeom prst="straightConnector1">
-            <a:avLst/>
-          </a:prstGeom>
-          <a:ln w="31750">
-            <a:solidFill>
-              <a:srgbClr val="FFC000"/>
-            </a:solidFill>
-            <a:headEnd type="triangle" w="med" len="med"/>
-            <a:tailEnd type="triangle"/>
-          </a:ln>
-        </p:spPr>
-        <p:style>
-          <a:lnRef idx="1">
-            <a:schemeClr val="accent4"/>
-          </a:lnRef>
-          <a:fillRef idx="0">
-            <a:schemeClr val="accent4"/>
-          </a:fillRef>
-          <a:effectRef idx="0">
-            <a:schemeClr val="accent4"/>
-          </a:effectRef>
-          <a:fontRef idx="minor">
-            <a:schemeClr val="tx1"/>
-          </a:fontRef>
-        </p:style>
-      </p:cxnSp>
-      <p:cxnSp>
-        <p:nvCxnSpPr>
-          <p:cNvPr id="88" name="Straight Arrow Connector 87">
-            <a:extLst>
-              <a:ext uri="{FF2B5EF4-FFF2-40B4-BE49-F238E27FC236}">
-                <a16:creationId xmlns:a16="http://schemas.microsoft.com/office/drawing/2014/main" id="{4BE860C7-CA6A-3146-8656-F27181970680}"/>
-              </a:ext>
-            </a:extLst>
-          </p:cNvPr>
-          <p:cNvCxnSpPr>
-            <a:cxnSpLocks/>
-          </p:cNvCxnSpPr>
-          <p:nvPr/>
-        </p:nvCxnSpPr>
-        <p:spPr bwMode="auto">
-          <a:xfrm>
-            <a:off x="5229824" y="3455474"/>
-            <a:ext cx="296219" cy="151"/>
-          </a:xfrm>
-          <a:prstGeom prst="straightConnector1">
-            <a:avLst/>
-          </a:prstGeom>
-          <a:ln w="31750">
-            <a:solidFill>
-              <a:srgbClr val="FFC000"/>
-            </a:solidFill>
-            <a:headEnd type="triangle" w="med" len="med"/>
-            <a:tailEnd type="triangle"/>
-          </a:ln>
-        </p:spPr>
-        <p:style>
-          <a:lnRef idx="1">
-            <a:schemeClr val="accent4"/>
-          </a:lnRef>
-          <a:fillRef idx="0">
-            <a:schemeClr val="accent4"/>
-          </a:fillRef>
-          <a:effectRef idx="0">
-            <a:schemeClr val="accent4"/>
-          </a:effectRef>
-          <a:fontRef idx="minor">
-            <a:schemeClr val="tx1"/>
-          </a:fontRef>
-        </p:style>
-      </p:cxnSp>
       <p:grpSp>
         <p:nvGrpSpPr>
           <p:cNvPr id="8" name="Group 7">
@@ -11945,16 +11560,633 @@
           <a:lstStyle/>
           <a:p>
             <a:r>
+              <a:rPr lang="en-US" sz="800" dirty="0">
+                <a:solidFill>
+                  <a:schemeClr val="tx1"/>
+                </a:solidFill>
+              </a:rPr>
+              <a:t>1. </a:t>
+            </a:r>
+            <a:r>
               <a:rPr lang="en-CH" sz="800" dirty="0">
                 <a:solidFill>
                   <a:schemeClr val="tx1"/>
                 </a:solidFill>
               </a:rPr>
-              <a:t>1. Consortium aggres on CC Def (including MRENCLAVE)</a:t>
+              <a:t>Consortium aggres on CC Def</a:t>
+            </a:r>
+            <a:endParaRPr lang="en-US" sz="800" dirty="0">
+              <a:solidFill>
+                <a:schemeClr val="tx1"/>
+              </a:solidFill>
+            </a:endParaRPr>
+          </a:p>
+          <a:p>
+            <a:pPr marL="137160"/>
+            <a:r>
+              <a:rPr lang="en-CH" sz="800" dirty="0">
+                <a:solidFill>
+                  <a:schemeClr val="tx1"/>
+                </a:solidFill>
+              </a:rPr>
+              <a:t>(including MRENCLAVE)</a:t>
             </a:r>
           </a:p>
         </p:txBody>
       </p:sp>
+      <p:sp>
+        <p:nvSpPr>
+          <p:cNvPr id="75" name="Rounded Rectangular Callout 74">
+            <a:extLst>
+              <a:ext uri="{FF2B5EF4-FFF2-40B4-BE49-F238E27FC236}">
+                <a16:creationId xmlns:a16="http://schemas.microsoft.com/office/drawing/2014/main" id="{B206CA69-85E1-7849-96A3-FC799E4959EB}"/>
+              </a:ext>
+            </a:extLst>
+          </p:cNvPr>
+          <p:cNvSpPr/>
+          <p:nvPr/>
+        </p:nvSpPr>
+        <p:spPr bwMode="auto">
+          <a:xfrm>
+            <a:off x="5286332" y="1504480"/>
+            <a:ext cx="1601388" cy="684839"/>
+          </a:xfrm>
+          <a:prstGeom prst="wedgeRoundRectCallout">
+            <a:avLst>
+              <a:gd name="adj1" fmla="val -7831"/>
+              <a:gd name="adj2" fmla="val 94064"/>
+              <a:gd name="adj3" fmla="val 16667"/>
+            </a:avLst>
+          </a:prstGeom>
+          <a:solidFill>
+            <a:schemeClr val="lt1">
+              <a:alpha val="95000"/>
+            </a:schemeClr>
+          </a:solidFill>
+          <a:ln w="12700">
+            <a:headEnd type="none" w="med" len="med"/>
+            <a:tailEnd type="none" w="med" len="med"/>
+          </a:ln>
+        </p:spPr>
+        <p:style>
+          <a:lnRef idx="2">
+            <a:schemeClr val="accent1"/>
+          </a:lnRef>
+          <a:fillRef idx="1">
+            <a:schemeClr val="lt1"/>
+          </a:fillRef>
+          <a:effectRef idx="0">
+            <a:schemeClr val="accent1"/>
+          </a:effectRef>
+          <a:fontRef idx="minor">
+            <a:schemeClr val="dk1"/>
+          </a:fontRef>
+        </p:style>
+        <p:txBody>
+          <a:bodyPr vert="horz" wrap="square" lIns="36000" tIns="36000" rIns="36000" bIns="36000" numCol="1" rtlCol="0" anchor="t" anchorCtr="0" compatLnSpc="1">
+            <a:prstTxWarp prst="textNoShape">
+              <a:avLst/>
+            </a:prstTxWarp>
+          </a:bodyPr>
+          <a:lstStyle/>
+          <a:p>
+            <a:r>
+              <a:rPr lang="en-CH" sz="800" dirty="0"/>
+              <a:t>4. Create enclave instance</a:t>
+            </a:r>
+          </a:p>
+          <a:p>
+            <a:pPr>
+              <a:tabLst>
+                <a:tab pos="914400" algn="l"/>
+              </a:tabLst>
+            </a:pPr>
+            <a:r>
+              <a:rPr lang="en-CH" sz="800" dirty="0"/>
+              <a:t>5. Generate enclave credentials</a:t>
+            </a:r>
+          </a:p>
+          <a:p>
+            <a:r>
+              <a:rPr lang="en-CH" sz="800" dirty="0"/>
+              <a:t>6. Generate attestation</a:t>
+            </a:r>
+            <a:endParaRPr lang="en-US" sz="800" dirty="0"/>
+          </a:p>
+          <a:p>
+            <a:pPr marL="109728" lvl="1"/>
+            <a:r>
+              <a:rPr lang="en-CH" sz="800" dirty="0"/>
+              <a:t>(including MRENCLAVE)</a:t>
+            </a:r>
+          </a:p>
+          <a:p>
+            <a:r>
+              <a:rPr lang="en-CH" sz="800" dirty="0"/>
+              <a:t>7. Return</a:t>
+            </a:r>
+          </a:p>
+        </p:txBody>
+      </p:sp>
+      <p:sp>
+        <p:nvSpPr>
+          <p:cNvPr id="76" name="Rounded Rectangular Callout 75">
+            <a:extLst>
+              <a:ext uri="{FF2B5EF4-FFF2-40B4-BE49-F238E27FC236}">
+                <a16:creationId xmlns:a16="http://schemas.microsoft.com/office/drawing/2014/main" id="{3EBFA0F0-B60B-B249-9EB8-AC4574DBF945}"/>
+              </a:ext>
+            </a:extLst>
+          </p:cNvPr>
+          <p:cNvSpPr/>
+          <p:nvPr/>
+        </p:nvSpPr>
+        <p:spPr bwMode="auto">
+          <a:xfrm>
+            <a:off x="6634856" y="3886709"/>
+            <a:ext cx="1295024" cy="428727"/>
+          </a:xfrm>
+          <a:prstGeom prst="wedgeRoundRectCallout">
+            <a:avLst>
+              <a:gd name="adj1" fmla="val -67979"/>
+              <a:gd name="adj2" fmla="val 33299"/>
+              <a:gd name="adj3" fmla="val 16667"/>
+            </a:avLst>
+          </a:prstGeom>
+          <a:solidFill>
+            <a:schemeClr val="lt1">
+              <a:alpha val="95000"/>
+            </a:schemeClr>
+          </a:solidFill>
+          <a:ln w="12700">
+            <a:headEnd type="none" w="med" len="med"/>
+            <a:tailEnd type="none" w="med" len="med"/>
+          </a:ln>
+        </p:spPr>
+        <p:style>
+          <a:lnRef idx="2">
+            <a:schemeClr val="accent1"/>
+          </a:lnRef>
+          <a:fillRef idx="1">
+            <a:schemeClr val="lt1"/>
+          </a:fillRef>
+          <a:effectRef idx="0">
+            <a:schemeClr val="accent1"/>
+          </a:effectRef>
+          <a:fontRef idx="minor">
+            <a:schemeClr val="dk1"/>
+          </a:fontRef>
+        </p:style>
+        <p:txBody>
+          <a:bodyPr vert="horz" wrap="square" lIns="36000" tIns="36000" rIns="36000" bIns="36000" numCol="1" rtlCol="0" anchor="t" anchorCtr="0" compatLnSpc="1">
+            <a:prstTxWarp prst="textNoShape">
+              <a:avLst/>
+            </a:prstTxWarp>
+          </a:bodyPr>
+          <a:lstStyle/>
+          <a:p>
+            <a:r>
+              <a:rPr lang="en-US" sz="800" dirty="0"/>
+              <a:t>11. Verify Evidence and</a:t>
+            </a:r>
+          </a:p>
+          <a:p>
+            <a:pPr marL="182880"/>
+            <a:r>
+              <a:rPr lang="en-US" sz="800" dirty="0"/>
+              <a:t>Credentials</a:t>
+            </a:r>
+          </a:p>
+          <a:p>
+            <a:r>
+              <a:rPr lang="en-US" sz="800" dirty="0"/>
+              <a:t>12. Check against CC Def</a:t>
+            </a:r>
+            <a:endParaRPr lang="en-CH" sz="800" dirty="0"/>
+          </a:p>
+        </p:txBody>
+      </p:sp>
+      <p:sp>
+        <p:nvSpPr>
+          <p:cNvPr id="77" name="Rounded Rectangular Callout 76">
+            <a:extLst>
+              <a:ext uri="{FF2B5EF4-FFF2-40B4-BE49-F238E27FC236}">
+                <a16:creationId xmlns:a16="http://schemas.microsoft.com/office/drawing/2014/main" id="{574E20AE-0FC7-B144-8066-3079CE69CCCD}"/>
+              </a:ext>
+            </a:extLst>
+          </p:cNvPr>
+          <p:cNvSpPr/>
+          <p:nvPr/>
+        </p:nvSpPr>
+        <p:spPr bwMode="auto">
+          <a:xfrm>
+            <a:off x="2400969" y="3815627"/>
+            <a:ext cx="812102" cy="254978"/>
+          </a:xfrm>
+          <a:prstGeom prst="wedgeRoundRectCallout">
+            <a:avLst>
+              <a:gd name="adj1" fmla="val 34351"/>
+              <a:gd name="adj2" fmla="val -105169"/>
+              <a:gd name="adj3" fmla="val 16667"/>
+            </a:avLst>
+          </a:prstGeom>
+          <a:solidFill>
+            <a:schemeClr val="lt1">
+              <a:alpha val="95000"/>
+            </a:schemeClr>
+          </a:solidFill>
+          <a:ln w="12700">
+            <a:headEnd type="none" w="med" len="med"/>
+            <a:tailEnd type="none" w="med" len="med"/>
+          </a:ln>
+        </p:spPr>
+        <p:style>
+          <a:lnRef idx="2">
+            <a:schemeClr val="accent1"/>
+          </a:lnRef>
+          <a:fillRef idx="1">
+            <a:schemeClr val="lt1"/>
+          </a:fillRef>
+          <a:effectRef idx="0">
+            <a:schemeClr val="accent1"/>
+          </a:effectRef>
+          <a:fontRef idx="minor">
+            <a:schemeClr val="dk1"/>
+          </a:fontRef>
+        </p:style>
+        <p:txBody>
+          <a:bodyPr vert="horz" wrap="square" lIns="36000" tIns="36000" rIns="36000" bIns="36000" numCol="1" rtlCol="0" anchor="ctr" anchorCtr="0" compatLnSpc="1">
+            <a:prstTxWarp prst="textNoShape">
+              <a:avLst/>
+            </a:prstTxWarp>
+          </a:bodyPr>
+          <a:lstStyle/>
+          <a:p>
+            <a:pPr algn="ctr"/>
+            <a:r>
+              <a:rPr lang="en-CH" sz="800" dirty="0">
+                <a:solidFill>
+                  <a:schemeClr val="tx1"/>
+                </a:solidFill>
+              </a:rPr>
+              <a:t>2. initEnclave</a:t>
+            </a:r>
+          </a:p>
+        </p:txBody>
+      </p:sp>
+      <p:sp>
+        <p:nvSpPr>
+          <p:cNvPr id="78" name="Rounded Rectangular Callout 77">
+            <a:extLst>
+              <a:ext uri="{FF2B5EF4-FFF2-40B4-BE49-F238E27FC236}">
+                <a16:creationId xmlns:a16="http://schemas.microsoft.com/office/drawing/2014/main" id="{271ED13A-F5EA-AE48-8F4C-D0CCEFC2CAC8}"/>
+              </a:ext>
+            </a:extLst>
+          </p:cNvPr>
+          <p:cNvSpPr/>
+          <p:nvPr/>
+        </p:nvSpPr>
+        <p:spPr bwMode="auto">
+          <a:xfrm>
+            <a:off x="3028249" y="2551920"/>
+            <a:ext cx="1378947" cy="254978"/>
+          </a:xfrm>
+          <a:prstGeom prst="wedgeRoundRectCallout">
+            <a:avLst>
+              <a:gd name="adj1" fmla="val 53875"/>
+              <a:gd name="adj2" fmla="val 153834"/>
+              <a:gd name="adj3" fmla="val 16667"/>
+            </a:avLst>
+          </a:prstGeom>
+          <a:solidFill>
+            <a:schemeClr val="lt1">
+              <a:alpha val="95000"/>
+            </a:schemeClr>
+          </a:solidFill>
+          <a:ln w="12700">
+            <a:headEnd type="none" w="med" len="med"/>
+            <a:tailEnd type="none" w="med" len="med"/>
+          </a:ln>
+        </p:spPr>
+        <p:style>
+          <a:lnRef idx="2">
+            <a:schemeClr val="accent1"/>
+          </a:lnRef>
+          <a:fillRef idx="1">
+            <a:schemeClr val="lt1"/>
+          </a:fillRef>
+          <a:effectRef idx="0">
+            <a:schemeClr val="accent1"/>
+          </a:effectRef>
+          <a:fontRef idx="minor">
+            <a:schemeClr val="dk1"/>
+          </a:fontRef>
+        </p:style>
+        <p:txBody>
+          <a:bodyPr vert="horz" wrap="square" lIns="36000" tIns="36000" rIns="36000" bIns="36000" numCol="1" rtlCol="0" anchor="ctr" anchorCtr="0" compatLnSpc="1">
+            <a:prstTxWarp prst="textNoShape">
+              <a:avLst/>
+            </a:prstTxWarp>
+          </a:bodyPr>
+          <a:lstStyle/>
+          <a:p>
+            <a:r>
+              <a:rPr lang="en-CH" sz="800" dirty="0">
+                <a:solidFill>
+                  <a:schemeClr val="tx1"/>
+                </a:solidFill>
+              </a:rPr>
+              <a:t>3. “Query” _initEnclave(…)</a:t>
+            </a:r>
+          </a:p>
+        </p:txBody>
+      </p:sp>
+      <p:sp>
+        <p:nvSpPr>
+          <p:cNvPr id="80" name="Rounded Rectangular Callout 79">
+            <a:extLst>
+              <a:ext uri="{FF2B5EF4-FFF2-40B4-BE49-F238E27FC236}">
+                <a16:creationId xmlns:a16="http://schemas.microsoft.com/office/drawing/2014/main" id="{1DBF061C-C79F-8349-8113-1B7DCAE58A16}"/>
+              </a:ext>
+            </a:extLst>
+          </p:cNvPr>
+          <p:cNvSpPr/>
+          <p:nvPr/>
+        </p:nvSpPr>
+        <p:spPr bwMode="auto">
+          <a:xfrm>
+            <a:off x="2598465" y="4424866"/>
+            <a:ext cx="1937976" cy="254978"/>
+          </a:xfrm>
+          <a:prstGeom prst="wedgeRoundRectCallout">
+            <a:avLst>
+              <a:gd name="adj1" fmla="val 42408"/>
+              <a:gd name="adj2" fmla="val -111145"/>
+              <a:gd name="adj3" fmla="val 16667"/>
+            </a:avLst>
+          </a:prstGeom>
+          <a:solidFill>
+            <a:schemeClr val="lt1">
+              <a:alpha val="95000"/>
+            </a:schemeClr>
+          </a:solidFill>
+          <a:ln w="12700">
+            <a:headEnd type="none" w="med" len="med"/>
+            <a:tailEnd type="none" w="med" len="med"/>
+          </a:ln>
+        </p:spPr>
+        <p:style>
+          <a:lnRef idx="2">
+            <a:schemeClr val="accent1"/>
+          </a:lnRef>
+          <a:fillRef idx="1">
+            <a:schemeClr val="lt1"/>
+          </a:fillRef>
+          <a:effectRef idx="0">
+            <a:schemeClr val="accent1"/>
+          </a:effectRef>
+          <a:fontRef idx="minor">
+            <a:schemeClr val="dk1"/>
+          </a:fontRef>
+        </p:style>
+        <p:txBody>
+          <a:bodyPr vert="horz" wrap="square" lIns="36000" tIns="36000" rIns="36000" bIns="36000" numCol="1" rtlCol="0" anchor="ctr" anchorCtr="0" compatLnSpc="1">
+            <a:prstTxWarp prst="textNoShape">
+              <a:avLst/>
+            </a:prstTxWarp>
+          </a:bodyPr>
+          <a:lstStyle/>
+          <a:p>
+            <a:r>
+              <a:rPr lang="en-CH" sz="800" dirty="0">
+                <a:solidFill>
+                  <a:schemeClr val="tx1"/>
+                </a:solidFill>
+              </a:rPr>
+              <a:t>10. “Invoke” registerEnclave(credentials)</a:t>
+            </a:r>
+          </a:p>
+        </p:txBody>
+      </p:sp>
+      <p:sp>
+        <p:nvSpPr>
+          <p:cNvPr id="81" name="Rounded Rectangular Callout 80">
+            <a:extLst>
+              <a:ext uri="{FF2B5EF4-FFF2-40B4-BE49-F238E27FC236}">
+                <a16:creationId xmlns:a16="http://schemas.microsoft.com/office/drawing/2014/main" id="{5987331D-33F2-B749-80AB-5C14061B626A}"/>
+              </a:ext>
+            </a:extLst>
+          </p:cNvPr>
+          <p:cNvSpPr/>
+          <p:nvPr/>
+        </p:nvSpPr>
+        <p:spPr bwMode="auto">
+          <a:xfrm>
+            <a:off x="3048252" y="1001800"/>
+            <a:ext cx="1999455" cy="254978"/>
+          </a:xfrm>
+          <a:prstGeom prst="wedgeRoundRectCallout">
+            <a:avLst>
+              <a:gd name="adj1" fmla="val 36344"/>
+              <a:gd name="adj2" fmla="val 119964"/>
+              <a:gd name="adj3" fmla="val 16667"/>
+            </a:avLst>
+          </a:prstGeom>
+          <a:solidFill>
+            <a:schemeClr val="lt1">
+              <a:alpha val="95000"/>
+            </a:schemeClr>
+          </a:solidFill>
+          <a:ln w="12700">
+            <a:headEnd type="none" w="med" len="med"/>
+            <a:tailEnd type="none" w="med" len="med"/>
+          </a:ln>
+        </p:spPr>
+        <p:style>
+          <a:lnRef idx="2">
+            <a:schemeClr val="accent1"/>
+          </a:lnRef>
+          <a:fillRef idx="1">
+            <a:schemeClr val="lt1"/>
+          </a:fillRef>
+          <a:effectRef idx="0">
+            <a:schemeClr val="accent1"/>
+          </a:effectRef>
+          <a:fontRef idx="minor">
+            <a:schemeClr val="dk1"/>
+          </a:fontRef>
+        </p:style>
+        <p:txBody>
+          <a:bodyPr vert="horz" wrap="square" lIns="36000" tIns="36000" rIns="36000" bIns="36000" numCol="1" rtlCol="0" anchor="ctr" anchorCtr="0" compatLnSpc="1">
+            <a:prstTxWarp prst="textNoShape">
+              <a:avLst/>
+            </a:prstTxWarp>
+          </a:bodyPr>
+          <a:lstStyle/>
+          <a:p>
+            <a:r>
+              <a:rPr lang="en-CH" sz="800" dirty="0">
+                <a:solidFill>
+                  <a:schemeClr val="tx1"/>
+                </a:solidFill>
+              </a:rPr>
+              <a:t>12. Submit registerEnclave tx for ordering</a:t>
+            </a:r>
+          </a:p>
+        </p:txBody>
+      </p:sp>
+      <p:sp>
+        <p:nvSpPr>
+          <p:cNvPr id="55" name="Rectangle 54">
+            <a:extLst>
+              <a:ext uri="{FF2B5EF4-FFF2-40B4-BE49-F238E27FC236}">
+                <a16:creationId xmlns:a16="http://schemas.microsoft.com/office/drawing/2014/main" id="{0ACD592F-CD23-429D-A11C-DA72E2F1DE83}"/>
+              </a:ext>
+            </a:extLst>
+          </p:cNvPr>
+          <p:cNvSpPr/>
+          <p:nvPr/>
+        </p:nvSpPr>
+        <p:spPr>
+          <a:xfrm>
+            <a:off x="4426751" y="2468170"/>
+            <a:ext cx="795910" cy="1145204"/>
+          </a:xfrm>
+          <a:prstGeom prst="rect">
+            <a:avLst/>
+          </a:prstGeom>
+          <a:solidFill>
+            <a:schemeClr val="bg2"/>
+          </a:solidFill>
+          <a:ln w="25400"/>
+          <a:effectLst>
+            <a:outerShdw blurRad="50800" dist="38100" dir="2700000" algn="tl" rotWithShape="0">
+              <a:prstClr val="black">
+                <a:alpha val="40000"/>
+              </a:prstClr>
+            </a:outerShdw>
+          </a:effectLst>
+        </p:spPr>
+        <p:style>
+          <a:lnRef idx="3">
+            <a:schemeClr val="lt1"/>
+          </a:lnRef>
+          <a:fillRef idx="1">
+            <a:schemeClr val="dk1"/>
+          </a:fillRef>
+          <a:effectRef idx="1">
+            <a:schemeClr val="dk1"/>
+          </a:effectRef>
+          <a:fontRef idx="minor">
+            <a:schemeClr val="lt1"/>
+          </a:fontRef>
+        </p:style>
+        <p:txBody>
+          <a:bodyPr rot="0" spcFirstLastPara="0" vertOverflow="overflow" horzOverflow="overflow" vert="horz" wrap="square" lIns="72000" tIns="72000" rIns="68580" bIns="34290" numCol="1" spcCol="0" rtlCol="0" fromWordArt="0" anchor="ctr" anchorCtr="0" forceAA="0" compatLnSpc="1">
+            <a:prstTxWarp prst="textNoShape">
+              <a:avLst/>
+            </a:prstTxWarp>
+            <a:noAutofit/>
+          </a:bodyPr>
+          <a:lstStyle/>
+          <a:p>
+            <a:pPr algn="ctr"/>
+            <a:r>
+              <a:rPr lang="en-US" sz="800" dirty="0"/>
+              <a:t>Shim</a:t>
+            </a:r>
+          </a:p>
+        </p:txBody>
+      </p:sp>
+      <p:cxnSp>
+        <p:nvCxnSpPr>
+          <p:cNvPr id="56" name="Straight Arrow Connector 55">
+            <a:extLst>
+              <a:ext uri="{FF2B5EF4-FFF2-40B4-BE49-F238E27FC236}">
+                <a16:creationId xmlns:a16="http://schemas.microsoft.com/office/drawing/2014/main" id="{D5BBB308-E941-4FCB-8AE8-CEB214181AF0}"/>
+              </a:ext>
+            </a:extLst>
+          </p:cNvPr>
+          <p:cNvCxnSpPr>
+            <a:cxnSpLocks/>
+          </p:cNvCxnSpPr>
+          <p:nvPr/>
+        </p:nvCxnSpPr>
+        <p:spPr bwMode="auto">
+          <a:xfrm flipV="1">
+            <a:off x="5222661" y="2626710"/>
+            <a:ext cx="296219" cy="10389"/>
+          </a:xfrm>
+          <a:prstGeom prst="straightConnector1">
+            <a:avLst/>
+          </a:prstGeom>
+          <a:ln w="31750">
+            <a:solidFill>
+              <a:srgbClr val="FFC000"/>
+            </a:solidFill>
+            <a:headEnd type="triangle" w="med" len="med"/>
+            <a:tailEnd type="triangle"/>
+          </a:ln>
+        </p:spPr>
+        <p:style>
+          <a:lnRef idx="1">
+            <a:schemeClr val="accent4"/>
+          </a:lnRef>
+          <a:fillRef idx="0">
+            <a:schemeClr val="accent4"/>
+          </a:fillRef>
+          <a:effectRef idx="0">
+            <a:schemeClr val="accent4"/>
+          </a:effectRef>
+          <a:fontRef idx="minor">
+            <a:schemeClr val="tx1"/>
+          </a:fontRef>
+        </p:style>
+      </p:cxnSp>
+      <p:cxnSp>
+        <p:nvCxnSpPr>
+          <p:cNvPr id="71" name="Straight Arrow Connector 70">
+            <a:extLst>
+              <a:ext uri="{FF2B5EF4-FFF2-40B4-BE49-F238E27FC236}">
+                <a16:creationId xmlns:a16="http://schemas.microsoft.com/office/drawing/2014/main" id="{C9BE4C6F-DFE4-4E17-825D-5D31ABCDFAB0}"/>
+              </a:ext>
+            </a:extLst>
+          </p:cNvPr>
+          <p:cNvCxnSpPr>
+            <a:cxnSpLocks/>
+          </p:cNvCxnSpPr>
+          <p:nvPr/>
+        </p:nvCxnSpPr>
+        <p:spPr bwMode="auto">
+          <a:xfrm>
+            <a:off x="5229824" y="3455474"/>
+            <a:ext cx="296219" cy="151"/>
+          </a:xfrm>
+          <a:prstGeom prst="straightConnector1">
+            <a:avLst/>
+          </a:prstGeom>
+          <a:ln w="31750">
+            <a:solidFill>
+              <a:srgbClr val="FFC000"/>
+            </a:solidFill>
+            <a:headEnd type="triangle" w="med" len="med"/>
+            <a:tailEnd type="triangle"/>
+          </a:ln>
+        </p:spPr>
+        <p:style>
+          <a:lnRef idx="1">
+            <a:schemeClr val="accent4"/>
+          </a:lnRef>
+          <a:fillRef idx="0">
+            <a:schemeClr val="accent4"/>
+          </a:fillRef>
+          <a:effectRef idx="0">
+            <a:schemeClr val="accent4"/>
+          </a:effectRef>
+          <a:fontRef idx="minor">
+            <a:schemeClr val="tx1"/>
+          </a:fontRef>
+        </p:style>
+      </p:cxnSp>
       <p:sp>
         <p:nvSpPr>
           <p:cNvPr id="66" name="Rounded Rectangular Callout 65">
@@ -12028,426 +12260,6 @@
                 </a:solidFill>
               </a:rPr>
               <a:t>9. Attach evidence to credentials</a:t>
-            </a:r>
-          </a:p>
-        </p:txBody>
-      </p:sp>
-      <p:sp>
-        <p:nvSpPr>
-          <p:cNvPr id="75" name="Rounded Rectangular Callout 74">
-            <a:extLst>
-              <a:ext uri="{FF2B5EF4-FFF2-40B4-BE49-F238E27FC236}">
-                <a16:creationId xmlns:a16="http://schemas.microsoft.com/office/drawing/2014/main" id="{B206CA69-85E1-7849-96A3-FC799E4959EB}"/>
-              </a:ext>
-            </a:extLst>
-          </p:cNvPr>
-          <p:cNvSpPr/>
-          <p:nvPr/>
-        </p:nvSpPr>
-        <p:spPr bwMode="auto">
-          <a:xfrm>
-            <a:off x="5286332" y="1504480"/>
-            <a:ext cx="1601388" cy="684839"/>
-          </a:xfrm>
-          <a:prstGeom prst="wedgeRoundRectCallout">
-            <a:avLst>
-              <a:gd name="adj1" fmla="val -7831"/>
-              <a:gd name="adj2" fmla="val 94064"/>
-              <a:gd name="adj3" fmla="val 16667"/>
-            </a:avLst>
-          </a:prstGeom>
-          <a:solidFill>
-            <a:schemeClr val="lt1">
-              <a:alpha val="95000"/>
-            </a:schemeClr>
-          </a:solidFill>
-          <a:ln w="12700">
-            <a:headEnd type="none" w="med" len="med"/>
-            <a:tailEnd type="none" w="med" len="med"/>
-          </a:ln>
-        </p:spPr>
-        <p:style>
-          <a:lnRef idx="2">
-            <a:schemeClr val="accent1"/>
-          </a:lnRef>
-          <a:fillRef idx="1">
-            <a:schemeClr val="lt1"/>
-          </a:fillRef>
-          <a:effectRef idx="0">
-            <a:schemeClr val="accent1"/>
-          </a:effectRef>
-          <a:fontRef idx="minor">
-            <a:schemeClr val="dk1"/>
-          </a:fontRef>
-        </p:style>
-        <p:txBody>
-          <a:bodyPr vert="horz" wrap="square" lIns="36000" tIns="36000" rIns="36000" bIns="36000" numCol="1" rtlCol="0" anchor="t" anchorCtr="0" compatLnSpc="1">
-            <a:prstTxWarp prst="textNoShape">
-              <a:avLst/>
-            </a:prstTxWarp>
-          </a:bodyPr>
-          <a:lstStyle/>
-          <a:p>
-            <a:r>
-              <a:rPr lang="en-CH" sz="800" dirty="0"/>
-              <a:t>4. Create enclave instance</a:t>
-            </a:r>
-          </a:p>
-          <a:p>
-            <a:r>
-              <a:rPr lang="en-CH" sz="800" dirty="0"/>
-              <a:t>5. Generate enclave credentials</a:t>
-            </a:r>
-          </a:p>
-          <a:p>
-            <a:r>
-              <a:rPr lang="en-CH" sz="800" dirty="0"/>
-              <a:t>6. Generate attestation (including MRENCLAVE)</a:t>
-            </a:r>
-          </a:p>
-          <a:p>
-            <a:r>
-              <a:rPr lang="en-CH" sz="800" dirty="0"/>
-              <a:t>7. Return</a:t>
-            </a:r>
-          </a:p>
-        </p:txBody>
-      </p:sp>
-      <p:sp>
-        <p:nvSpPr>
-          <p:cNvPr id="76" name="Rounded Rectangular Callout 75">
-            <a:extLst>
-              <a:ext uri="{FF2B5EF4-FFF2-40B4-BE49-F238E27FC236}">
-                <a16:creationId xmlns:a16="http://schemas.microsoft.com/office/drawing/2014/main" id="{3EBFA0F0-B60B-B249-9EB8-AC4574DBF945}"/>
-              </a:ext>
-            </a:extLst>
-          </p:cNvPr>
-          <p:cNvSpPr/>
-          <p:nvPr/>
-        </p:nvSpPr>
-        <p:spPr bwMode="auto">
-          <a:xfrm>
-            <a:off x="6634856" y="3886709"/>
-            <a:ext cx="1295024" cy="428727"/>
-          </a:xfrm>
-          <a:prstGeom prst="wedgeRoundRectCallout">
-            <a:avLst>
-              <a:gd name="adj1" fmla="val -67979"/>
-              <a:gd name="adj2" fmla="val 33299"/>
-              <a:gd name="adj3" fmla="val 16667"/>
-            </a:avLst>
-          </a:prstGeom>
-          <a:solidFill>
-            <a:schemeClr val="lt1">
-              <a:alpha val="95000"/>
-            </a:schemeClr>
-          </a:solidFill>
-          <a:ln w="12700">
-            <a:headEnd type="none" w="med" len="med"/>
-            <a:tailEnd type="none" w="med" len="med"/>
-          </a:ln>
-        </p:spPr>
-        <p:style>
-          <a:lnRef idx="2">
-            <a:schemeClr val="accent1"/>
-          </a:lnRef>
-          <a:fillRef idx="1">
-            <a:schemeClr val="lt1"/>
-          </a:fillRef>
-          <a:effectRef idx="0">
-            <a:schemeClr val="accent1"/>
-          </a:effectRef>
-          <a:fontRef idx="minor">
-            <a:schemeClr val="dk1"/>
-          </a:fontRef>
-        </p:style>
-        <p:txBody>
-          <a:bodyPr vert="horz" wrap="square" lIns="36000" tIns="36000" rIns="36000" bIns="36000" numCol="1" rtlCol="0" anchor="t" anchorCtr="0" compatLnSpc="1">
-            <a:prstTxWarp prst="textNoShape">
-              <a:avLst/>
-            </a:prstTxWarp>
-          </a:bodyPr>
-          <a:lstStyle/>
-          <a:p>
-            <a:r>
-              <a:rPr lang="en-US" sz="800" dirty="0"/>
-              <a:t>11. Verify Evidence and Credentials</a:t>
-            </a:r>
-          </a:p>
-          <a:p>
-            <a:r>
-              <a:rPr lang="en-US" sz="800" dirty="0"/>
-              <a:t>12. Check against CC Def</a:t>
-            </a:r>
-            <a:endParaRPr lang="en-CH" sz="800" dirty="0"/>
-          </a:p>
-        </p:txBody>
-      </p:sp>
-      <p:sp>
-        <p:nvSpPr>
-          <p:cNvPr id="77" name="Rounded Rectangular Callout 76">
-            <a:extLst>
-              <a:ext uri="{FF2B5EF4-FFF2-40B4-BE49-F238E27FC236}">
-                <a16:creationId xmlns:a16="http://schemas.microsoft.com/office/drawing/2014/main" id="{574E20AE-0FC7-B144-8066-3079CE69CCCD}"/>
-              </a:ext>
-            </a:extLst>
-          </p:cNvPr>
-          <p:cNvSpPr/>
-          <p:nvPr/>
-        </p:nvSpPr>
-        <p:spPr bwMode="auto">
-          <a:xfrm>
-            <a:off x="2400969" y="3815627"/>
-            <a:ext cx="812102" cy="254978"/>
-          </a:xfrm>
-          <a:prstGeom prst="wedgeRoundRectCallout">
-            <a:avLst>
-              <a:gd name="adj1" fmla="val 34351"/>
-              <a:gd name="adj2" fmla="val -105169"/>
-              <a:gd name="adj3" fmla="val 16667"/>
-            </a:avLst>
-          </a:prstGeom>
-          <a:solidFill>
-            <a:schemeClr val="lt1">
-              <a:alpha val="95000"/>
-            </a:schemeClr>
-          </a:solidFill>
-          <a:ln w="12700">
-            <a:headEnd type="none" w="med" len="med"/>
-            <a:tailEnd type="none" w="med" len="med"/>
-          </a:ln>
-        </p:spPr>
-        <p:style>
-          <a:lnRef idx="2">
-            <a:schemeClr val="accent1"/>
-          </a:lnRef>
-          <a:fillRef idx="1">
-            <a:schemeClr val="lt1"/>
-          </a:fillRef>
-          <a:effectRef idx="0">
-            <a:schemeClr val="accent1"/>
-          </a:effectRef>
-          <a:fontRef idx="minor">
-            <a:schemeClr val="dk1"/>
-          </a:fontRef>
-        </p:style>
-        <p:txBody>
-          <a:bodyPr vert="horz" wrap="square" lIns="36000" tIns="36000" rIns="36000" bIns="36000" numCol="1" rtlCol="0" anchor="ctr" anchorCtr="0" compatLnSpc="1">
-            <a:prstTxWarp prst="textNoShape">
-              <a:avLst/>
-            </a:prstTxWarp>
-          </a:bodyPr>
-          <a:lstStyle/>
-          <a:p>
-            <a:pPr algn="ctr"/>
-            <a:r>
-              <a:rPr lang="en-CH" sz="800" dirty="0">
-                <a:solidFill>
-                  <a:schemeClr val="tx1"/>
-                </a:solidFill>
-              </a:rPr>
-              <a:t>2. initEnclave</a:t>
-            </a:r>
-          </a:p>
-        </p:txBody>
-      </p:sp>
-      <p:sp>
-        <p:nvSpPr>
-          <p:cNvPr id="78" name="Rounded Rectangular Callout 77">
-            <a:extLst>
-              <a:ext uri="{FF2B5EF4-FFF2-40B4-BE49-F238E27FC236}">
-                <a16:creationId xmlns:a16="http://schemas.microsoft.com/office/drawing/2014/main" id="{271ED13A-F5EA-AE48-8F4C-D0CCEFC2CAC8}"/>
-              </a:ext>
-            </a:extLst>
-          </p:cNvPr>
-          <p:cNvSpPr/>
-          <p:nvPr/>
-        </p:nvSpPr>
-        <p:spPr bwMode="auto">
-          <a:xfrm>
-            <a:off x="3028249" y="2551920"/>
-            <a:ext cx="1378947" cy="254978"/>
-          </a:xfrm>
-          <a:prstGeom prst="wedgeRoundRectCallout">
-            <a:avLst>
-              <a:gd name="adj1" fmla="val 53875"/>
-              <a:gd name="adj2" fmla="val 153834"/>
-              <a:gd name="adj3" fmla="val 16667"/>
-            </a:avLst>
-          </a:prstGeom>
-          <a:solidFill>
-            <a:schemeClr val="lt1">
-              <a:alpha val="95000"/>
-            </a:schemeClr>
-          </a:solidFill>
-          <a:ln w="12700">
-            <a:headEnd type="none" w="med" len="med"/>
-            <a:tailEnd type="none" w="med" len="med"/>
-          </a:ln>
-        </p:spPr>
-        <p:style>
-          <a:lnRef idx="2">
-            <a:schemeClr val="accent1"/>
-          </a:lnRef>
-          <a:fillRef idx="1">
-            <a:schemeClr val="lt1"/>
-          </a:fillRef>
-          <a:effectRef idx="0">
-            <a:schemeClr val="accent1"/>
-          </a:effectRef>
-          <a:fontRef idx="minor">
-            <a:schemeClr val="dk1"/>
-          </a:fontRef>
-        </p:style>
-        <p:txBody>
-          <a:bodyPr vert="horz" wrap="square" lIns="36000" tIns="36000" rIns="36000" bIns="36000" numCol="1" rtlCol="0" anchor="ctr" anchorCtr="0" compatLnSpc="1">
-            <a:prstTxWarp prst="textNoShape">
-              <a:avLst/>
-            </a:prstTxWarp>
-          </a:bodyPr>
-          <a:lstStyle/>
-          <a:p>
-            <a:r>
-              <a:rPr lang="en-CH" sz="800" dirty="0">
-                <a:solidFill>
-                  <a:schemeClr val="tx1"/>
-                </a:solidFill>
-              </a:rPr>
-              <a:t>3. “Query” _initEnclave(…)</a:t>
-            </a:r>
-          </a:p>
-        </p:txBody>
-      </p:sp>
-      <p:sp>
-        <p:nvSpPr>
-          <p:cNvPr id="80" name="Rounded Rectangular Callout 79">
-            <a:extLst>
-              <a:ext uri="{FF2B5EF4-FFF2-40B4-BE49-F238E27FC236}">
-                <a16:creationId xmlns:a16="http://schemas.microsoft.com/office/drawing/2014/main" id="{1DBF061C-C79F-8349-8113-1B7DCAE58A16}"/>
-              </a:ext>
-            </a:extLst>
-          </p:cNvPr>
-          <p:cNvSpPr/>
-          <p:nvPr/>
-        </p:nvSpPr>
-        <p:spPr bwMode="auto">
-          <a:xfrm>
-            <a:off x="2598465" y="4424866"/>
-            <a:ext cx="1937976" cy="254978"/>
-          </a:xfrm>
-          <a:prstGeom prst="wedgeRoundRectCallout">
-            <a:avLst>
-              <a:gd name="adj1" fmla="val 42408"/>
-              <a:gd name="adj2" fmla="val -111145"/>
-              <a:gd name="adj3" fmla="val 16667"/>
-            </a:avLst>
-          </a:prstGeom>
-          <a:solidFill>
-            <a:schemeClr val="lt1">
-              <a:alpha val="95000"/>
-            </a:schemeClr>
-          </a:solidFill>
-          <a:ln w="12700">
-            <a:headEnd type="none" w="med" len="med"/>
-            <a:tailEnd type="none" w="med" len="med"/>
-          </a:ln>
-        </p:spPr>
-        <p:style>
-          <a:lnRef idx="2">
-            <a:schemeClr val="accent1"/>
-          </a:lnRef>
-          <a:fillRef idx="1">
-            <a:schemeClr val="lt1"/>
-          </a:fillRef>
-          <a:effectRef idx="0">
-            <a:schemeClr val="accent1"/>
-          </a:effectRef>
-          <a:fontRef idx="minor">
-            <a:schemeClr val="dk1"/>
-          </a:fontRef>
-        </p:style>
-        <p:txBody>
-          <a:bodyPr vert="horz" wrap="square" lIns="36000" tIns="36000" rIns="36000" bIns="36000" numCol="1" rtlCol="0" anchor="ctr" anchorCtr="0" compatLnSpc="1">
-            <a:prstTxWarp prst="textNoShape">
-              <a:avLst/>
-            </a:prstTxWarp>
-          </a:bodyPr>
-          <a:lstStyle/>
-          <a:p>
-            <a:r>
-              <a:rPr lang="en-CH" sz="800" dirty="0">
-                <a:solidFill>
-                  <a:schemeClr val="tx1"/>
-                </a:solidFill>
-              </a:rPr>
-              <a:t>10. “Invoke” registerEnclave(credentials)</a:t>
-            </a:r>
-          </a:p>
-        </p:txBody>
-      </p:sp>
-      <p:sp>
-        <p:nvSpPr>
-          <p:cNvPr id="81" name="Rounded Rectangular Callout 80">
-            <a:extLst>
-              <a:ext uri="{FF2B5EF4-FFF2-40B4-BE49-F238E27FC236}">
-                <a16:creationId xmlns:a16="http://schemas.microsoft.com/office/drawing/2014/main" id="{5987331D-33F2-B749-80AB-5C14061B626A}"/>
-              </a:ext>
-            </a:extLst>
-          </p:cNvPr>
-          <p:cNvSpPr/>
-          <p:nvPr/>
-        </p:nvSpPr>
-        <p:spPr bwMode="auto">
-          <a:xfrm>
-            <a:off x="3048252" y="1001800"/>
-            <a:ext cx="1999455" cy="254978"/>
-          </a:xfrm>
-          <a:prstGeom prst="wedgeRoundRectCallout">
-            <a:avLst>
-              <a:gd name="adj1" fmla="val 36344"/>
-              <a:gd name="adj2" fmla="val 119964"/>
-              <a:gd name="adj3" fmla="val 16667"/>
-            </a:avLst>
-          </a:prstGeom>
-          <a:solidFill>
-            <a:schemeClr val="lt1">
-              <a:alpha val="95000"/>
-            </a:schemeClr>
-          </a:solidFill>
-          <a:ln w="12700">
-            <a:headEnd type="none" w="med" len="med"/>
-            <a:tailEnd type="none" w="med" len="med"/>
-          </a:ln>
-        </p:spPr>
-        <p:style>
-          <a:lnRef idx="2">
-            <a:schemeClr val="accent1"/>
-          </a:lnRef>
-          <a:fillRef idx="1">
-            <a:schemeClr val="lt1"/>
-          </a:fillRef>
-          <a:effectRef idx="0">
-            <a:schemeClr val="accent1"/>
-          </a:effectRef>
-          <a:fontRef idx="minor">
-            <a:schemeClr val="dk1"/>
-          </a:fontRef>
-        </p:style>
-        <p:txBody>
-          <a:bodyPr vert="horz" wrap="square" lIns="36000" tIns="36000" rIns="36000" bIns="36000" numCol="1" rtlCol="0" anchor="ctr" anchorCtr="0" compatLnSpc="1">
-            <a:prstTxWarp prst="textNoShape">
-              <a:avLst/>
-            </a:prstTxWarp>
-          </a:bodyPr>
-          <a:lstStyle/>
-          <a:p>
-            <a:r>
-              <a:rPr lang="en-CH" sz="800" dirty="0">
-                <a:solidFill>
-                  <a:schemeClr val="tx1"/>
-                </a:solidFill>
-              </a:rPr>
-              <a:t>12. Submit registerEnclave tx for ordering</a:t>
             </a:r>
           </a:p>
         </p:txBody>
@@ -12763,7 +12575,7 @@
             <a:avLst/>
           </a:prstGeom>
           <a:solidFill>
-            <a:schemeClr val="tx1"/>
+            <a:schemeClr val="bg2"/>
           </a:solidFill>
           <a:ln w="25400"/>
           <a:effectLst>
@@ -12826,7 +12638,7 @@
             <a:avLst/>
           </a:prstGeom>
           <a:solidFill>
-            <a:schemeClr val="tx1"/>
+            <a:schemeClr val="bg2"/>
           </a:solidFill>
           <a:ln w="25400"/>
           <a:effectLst>
@@ -13067,10 +12879,10 @@
       </p:grpSp>
       <p:sp>
         <p:nvSpPr>
-          <p:cNvPr id="44" name="Rectangle 43">
+          <p:cNvPr id="46" name="Rectangle 45">
             <a:extLst>
               <a:ext uri="{FF2B5EF4-FFF2-40B4-BE49-F238E27FC236}">
-                <a16:creationId xmlns:a16="http://schemas.microsoft.com/office/drawing/2014/main" id="{254682A9-554F-A347-BFDE-49F7B1A1E46C}"/>
+                <a16:creationId xmlns:a16="http://schemas.microsoft.com/office/drawing/2014/main" id="{BEB84A8F-5A5D-8C48-8BED-0ED364AC54AE}"/>
               </a:ext>
             </a:extLst>
           </p:cNvPr>
@@ -13079,14 +12891,14 @@
         </p:nvSpPr>
         <p:spPr>
           <a:xfrm>
-            <a:off x="4426751" y="2468170"/>
-            <a:ext cx="795910" cy="316777"/>
+            <a:off x="5453925" y="3293390"/>
+            <a:ext cx="1044760" cy="440066"/>
           </a:xfrm>
           <a:prstGeom prst="rect">
             <a:avLst/>
           </a:prstGeom>
           <a:solidFill>
-            <a:schemeClr val="tx1"/>
+            <a:schemeClr val="bg2"/>
           </a:solidFill>
           <a:ln w="25400"/>
           <a:effectLst>
@@ -13123,191 +12935,11 @@
             <a:pPr algn="ctr"/>
             <a:r>
               <a:rPr lang="en-US" sz="800" dirty="0"/>
-              <a:t>Shim</a:t>
+              <a:t>Enclave Endorsement Validation</a:t>
             </a:r>
           </a:p>
         </p:txBody>
       </p:sp>
-      <p:sp>
-        <p:nvSpPr>
-          <p:cNvPr id="45" name="Rectangle 44">
-            <a:extLst>
-              <a:ext uri="{FF2B5EF4-FFF2-40B4-BE49-F238E27FC236}">
-                <a16:creationId xmlns:a16="http://schemas.microsoft.com/office/drawing/2014/main" id="{D277D9A1-D43F-764A-AE04-174DB2F97071}"/>
-              </a:ext>
-            </a:extLst>
-          </p:cNvPr>
-          <p:cNvSpPr/>
-          <p:nvPr/>
-        </p:nvSpPr>
-        <p:spPr>
-          <a:xfrm>
-            <a:off x="4426751" y="2886151"/>
-            <a:ext cx="795910" cy="697331"/>
-          </a:xfrm>
-          <a:prstGeom prst="rect">
-            <a:avLst/>
-          </a:prstGeom>
-          <a:solidFill>
-            <a:schemeClr val="tx1"/>
-          </a:solidFill>
-          <a:ln w="25400"/>
-          <a:effectLst>
-            <a:outerShdw blurRad="50800" dist="38100" dir="2700000" algn="tl" rotWithShape="0">
-              <a:prstClr val="black">
-                <a:alpha val="40000"/>
-              </a:prstClr>
-            </a:outerShdw>
-          </a:effectLst>
-        </p:spPr>
-        <p:style>
-          <a:lnRef idx="3">
-            <a:schemeClr val="lt1"/>
-          </a:lnRef>
-          <a:fillRef idx="1">
-            <a:schemeClr val="dk1"/>
-          </a:fillRef>
-          <a:effectRef idx="1">
-            <a:schemeClr val="dk1"/>
-          </a:effectRef>
-          <a:fontRef idx="minor">
-            <a:schemeClr val="lt1"/>
-          </a:fontRef>
-        </p:style>
-        <p:txBody>
-          <a:bodyPr rot="0" spcFirstLastPara="0" vertOverflow="overflow" horzOverflow="overflow" vert="horz" wrap="square" lIns="72000" tIns="72000" rIns="68580" bIns="34290" numCol="1" spcCol="0" rtlCol="0" fromWordArt="0" anchor="ctr" anchorCtr="0" forceAA="0" compatLnSpc="1">
-            <a:prstTxWarp prst="textNoShape">
-              <a:avLst/>
-            </a:prstTxWarp>
-            <a:noAutofit/>
-          </a:bodyPr>
-          <a:lstStyle/>
-          <a:p>
-            <a:pPr algn="ctr"/>
-            <a:r>
-              <a:rPr lang="en-US" sz="800" dirty="0"/>
-              <a:t>Wrapper</a:t>
-            </a:r>
-            <a:br>
-              <a:rPr lang="en-US" sz="800" dirty="0"/>
-            </a:br>
-            <a:r>
-              <a:rPr lang="en-US" sz="800" dirty="0"/>
-              <a:t>Chaincode</a:t>
-            </a:r>
-          </a:p>
-        </p:txBody>
-      </p:sp>
-      <p:sp>
-        <p:nvSpPr>
-          <p:cNvPr id="46" name="Rectangle 45">
-            <a:extLst>
-              <a:ext uri="{FF2B5EF4-FFF2-40B4-BE49-F238E27FC236}">
-                <a16:creationId xmlns:a16="http://schemas.microsoft.com/office/drawing/2014/main" id="{BEB84A8F-5A5D-8C48-8BED-0ED364AC54AE}"/>
-              </a:ext>
-            </a:extLst>
-          </p:cNvPr>
-          <p:cNvSpPr/>
-          <p:nvPr/>
-        </p:nvSpPr>
-        <p:spPr>
-          <a:xfrm>
-            <a:off x="5453925" y="3293390"/>
-            <a:ext cx="1044760" cy="440066"/>
-          </a:xfrm>
-          <a:prstGeom prst="rect">
-            <a:avLst/>
-          </a:prstGeom>
-          <a:solidFill>
-            <a:schemeClr val="tx1"/>
-          </a:solidFill>
-          <a:ln w="25400"/>
-          <a:effectLst>
-            <a:outerShdw blurRad="50800" dist="38100" dir="2700000" algn="tl" rotWithShape="0">
-              <a:prstClr val="black">
-                <a:alpha val="40000"/>
-              </a:prstClr>
-            </a:outerShdw>
-          </a:effectLst>
-        </p:spPr>
-        <p:style>
-          <a:lnRef idx="3">
-            <a:schemeClr val="lt1"/>
-          </a:lnRef>
-          <a:fillRef idx="1">
-            <a:schemeClr val="dk1"/>
-          </a:fillRef>
-          <a:effectRef idx="1">
-            <a:schemeClr val="dk1"/>
-          </a:effectRef>
-          <a:fontRef idx="minor">
-            <a:schemeClr val="lt1"/>
-          </a:fontRef>
-        </p:style>
-        <p:txBody>
-          <a:bodyPr rot="0" spcFirstLastPara="0" vertOverflow="overflow" horzOverflow="overflow" vert="horz" wrap="square" lIns="72000" tIns="72000" rIns="68580" bIns="34290" numCol="1" spcCol="0" rtlCol="0" fromWordArt="0" anchor="ctr" anchorCtr="0" forceAA="0" compatLnSpc="1">
-            <a:prstTxWarp prst="textNoShape">
-              <a:avLst/>
-            </a:prstTxWarp>
-            <a:noAutofit/>
-          </a:bodyPr>
-          <a:lstStyle/>
-          <a:p>
-            <a:pPr algn="ctr"/>
-            <a:r>
-              <a:rPr lang="en-US" sz="800" dirty="0"/>
-              <a:t>Enclave Endorsement Validation</a:t>
-            </a:r>
-          </a:p>
-        </p:txBody>
-      </p:sp>
-      <p:cxnSp>
-        <p:nvCxnSpPr>
-          <p:cNvPr id="51" name="Straight Arrow Connector 50">
-            <a:extLst>
-              <a:ext uri="{FF2B5EF4-FFF2-40B4-BE49-F238E27FC236}">
-                <a16:creationId xmlns:a16="http://schemas.microsoft.com/office/drawing/2014/main" id="{0BD82215-997C-7346-9587-E4BFD02DF7C0}"/>
-              </a:ext>
-            </a:extLst>
-          </p:cNvPr>
-          <p:cNvCxnSpPr>
-            <a:cxnSpLocks/>
-            <a:stCxn id="44" idx="3"/>
-            <a:endCxn id="33" idx="1"/>
-          </p:cNvCxnSpPr>
-          <p:nvPr/>
-        </p:nvCxnSpPr>
-        <p:spPr bwMode="auto">
-          <a:xfrm>
-            <a:off x="5222661" y="2626559"/>
-            <a:ext cx="296219" cy="151"/>
-          </a:xfrm>
-          <a:prstGeom prst="straightConnector1">
-            <a:avLst/>
-          </a:prstGeom>
-          <a:ln w="31750">
-            <a:solidFill>
-              <a:srgbClr val="FFC000"/>
-            </a:solidFill>
-            <a:headEnd type="triangle" w="med" len="med"/>
-            <a:tailEnd type="triangle"/>
-          </a:ln>
-        </p:spPr>
-        <p:style>
-          <a:lnRef idx="1">
-            <a:schemeClr val="accent4"/>
-          </a:lnRef>
-          <a:fillRef idx="0">
-            <a:schemeClr val="accent4"/>
-          </a:fillRef>
-          <a:effectRef idx="0">
-            <a:schemeClr val="accent4"/>
-          </a:effectRef>
-          <a:fontRef idx="minor">
-            <a:schemeClr val="tx1"/>
-          </a:fontRef>
-        </p:style>
-      </p:cxnSp>
       <p:cxnSp>
         <p:nvCxnSpPr>
           <p:cNvPr id="53" name="Straight Arrow Connector 52">
@@ -13448,7 +13080,6 @@
           <p:cNvCxnSpPr>
             <a:cxnSpLocks/>
             <a:stCxn id="73" idx="3"/>
-            <a:endCxn id="45" idx="1"/>
           </p:cNvCxnSpPr>
           <p:nvPr/>
         </p:nvCxnSpPr>
@@ -13955,7 +13586,7 @@
               <p:nvPr/>
             </p:nvPicPr>
             <p:blipFill>
-              <a:blip r:embed="rId4">
+              <a:blip r:embed="rId4" cstate="print">
                 <a:extLst>
                   <a:ext uri="{28A0092B-C50C-407E-A947-70E740481C1C}">
                     <a14:useLocalDpi xmlns:a14="http://schemas.microsoft.com/office/drawing/2010/main" val="0"/>
@@ -14056,7 +13687,7 @@
               <a:avLst/>
             </a:prstGeom>
             <a:solidFill>
-              <a:schemeClr val="tx1"/>
+              <a:schemeClr val="bg2"/>
             </a:solidFill>
             <a:ln w="25400"/>
             <a:effectLst>
@@ -14126,7 +13757,7 @@
               <a:avLst/>
             </a:prstGeom>
             <a:solidFill>
-              <a:schemeClr val="tx1"/>
+              <a:schemeClr val="bg2"/>
             </a:solidFill>
             <a:ln w="25400"/>
             <a:effectLst>
@@ -14169,96 +13800,6 @@
           </p:txBody>
         </p:sp>
       </p:grpSp>
-      <p:cxnSp>
-        <p:nvCxnSpPr>
-          <p:cNvPr id="86" name="Straight Arrow Connector 85">
-            <a:extLst>
-              <a:ext uri="{FF2B5EF4-FFF2-40B4-BE49-F238E27FC236}">
-                <a16:creationId xmlns:a16="http://schemas.microsoft.com/office/drawing/2014/main" id="{9F07A962-3006-7D44-8E32-A24F6480BCC5}"/>
-              </a:ext>
-            </a:extLst>
-          </p:cNvPr>
-          <p:cNvCxnSpPr>
-            <a:cxnSpLocks/>
-          </p:cNvCxnSpPr>
-          <p:nvPr/>
-        </p:nvCxnSpPr>
-        <p:spPr bwMode="auto">
-          <a:xfrm>
-            <a:off x="5229824" y="3032887"/>
-            <a:ext cx="296219" cy="151"/>
-          </a:xfrm>
-          <a:prstGeom prst="straightConnector1">
-            <a:avLst/>
-          </a:prstGeom>
-          <a:ln w="31750">
-            <a:solidFill>
-              <a:srgbClr val="FFC000"/>
-            </a:solidFill>
-            <a:headEnd type="triangle" w="med" len="med"/>
-            <a:tailEnd type="triangle"/>
-          </a:ln>
-        </p:spPr>
-        <p:style>
-          <a:lnRef idx="1">
-            <a:schemeClr val="accent4"/>
-          </a:lnRef>
-          <a:fillRef idx="0">
-            <a:schemeClr val="accent4"/>
-          </a:fillRef>
-          <a:effectRef idx="0">
-            <a:schemeClr val="accent4"/>
-          </a:effectRef>
-          <a:fontRef idx="minor">
-            <a:schemeClr val="tx1"/>
-          </a:fontRef>
-        </p:style>
-      </p:cxnSp>
-      <p:cxnSp>
-        <p:nvCxnSpPr>
-          <p:cNvPr id="88" name="Straight Arrow Connector 87">
-            <a:extLst>
-              <a:ext uri="{FF2B5EF4-FFF2-40B4-BE49-F238E27FC236}">
-                <a16:creationId xmlns:a16="http://schemas.microsoft.com/office/drawing/2014/main" id="{4BE860C7-CA6A-3146-8656-F27181970680}"/>
-              </a:ext>
-            </a:extLst>
-          </p:cNvPr>
-          <p:cNvCxnSpPr>
-            <a:cxnSpLocks/>
-          </p:cNvCxnSpPr>
-          <p:nvPr/>
-        </p:nvCxnSpPr>
-        <p:spPr bwMode="auto">
-          <a:xfrm>
-            <a:off x="5229824" y="3455474"/>
-            <a:ext cx="296219" cy="151"/>
-          </a:xfrm>
-          <a:prstGeom prst="straightConnector1">
-            <a:avLst/>
-          </a:prstGeom>
-          <a:ln w="31750">
-            <a:solidFill>
-              <a:srgbClr val="FFC000"/>
-            </a:solidFill>
-            <a:headEnd type="triangle" w="med" len="med"/>
-            <a:tailEnd type="triangle"/>
-          </a:ln>
-        </p:spPr>
-        <p:style>
-          <a:lnRef idx="1">
-            <a:schemeClr val="accent4"/>
-          </a:lnRef>
-          <a:fillRef idx="0">
-            <a:schemeClr val="accent4"/>
-          </a:fillRef>
-          <a:effectRef idx="0">
-            <a:schemeClr val="accent4"/>
-          </a:effectRef>
-          <a:fontRef idx="minor">
-            <a:schemeClr val="tx1"/>
-          </a:fontRef>
-        </p:style>
-      </p:cxnSp>
       <p:grpSp>
         <p:nvGrpSpPr>
           <p:cNvPr id="8" name="Group 7">
@@ -14730,8 +14271,8 @@
         </p:nvSpPr>
         <p:spPr bwMode="auto">
           <a:xfrm>
-            <a:off x="4830312" y="1446664"/>
-            <a:ext cx="1592551" cy="562607"/>
+            <a:off x="4830312" y="1311376"/>
+            <a:ext cx="1592551" cy="697896"/>
           </a:xfrm>
           <a:prstGeom prst="wedgeRoundRectCallout">
             <a:avLst>
@@ -14777,7 +14318,15 @@
           <a:p>
             <a:r>
               <a:rPr lang="en-CH" sz="800" dirty="0"/>
-              <a:t>6. Decrypt args</a:t>
+              <a:t>6.</a:t>
+            </a:r>
+            <a:r>
+              <a:rPr lang="en-US" sz="800" dirty="0"/>
+              <a:t> </a:t>
+            </a:r>
+            <a:r>
+              <a:rPr lang="en-CH" sz="800" dirty="0"/>
+              <a:t>Decrypt args</a:t>
             </a:r>
           </a:p>
           <a:p>
@@ -14785,11 +14334,23 @@
               <a:rPr lang="en-CH" sz="800" dirty="0"/>
               <a:t>7. Execute chaincode logic</a:t>
             </a:r>
-          </a:p>
-          <a:p>
+            <a:endParaRPr lang="en-US" sz="800" dirty="0"/>
+          </a:p>
+          <a:p>
+            <a:r>
+              <a:rPr lang="en-US" sz="800" dirty="0"/>
+              <a:t>8. Encrypt response</a:t>
+            </a:r>
+            <a:endParaRPr lang="en-CH" sz="800" dirty="0"/>
+          </a:p>
+          <a:p>
+            <a:r>
+              <a:rPr lang="en-US" sz="800" dirty="0"/>
+              <a:t>9</a:t>
+            </a:r>
             <a:r>
               <a:rPr lang="en-CH" sz="800" dirty="0"/>
-              <a:t>8. </a:t>
+              <a:t>. </a:t>
             </a:r>
             <a:r>
               <a:rPr lang="en-GB" sz="800" dirty="0"/>
@@ -14802,8 +14363,12 @@
           </a:p>
           <a:p>
             <a:r>
+              <a:rPr lang="en-US" sz="800" dirty="0"/>
+              <a:t>10</a:t>
+            </a:r>
+            <a:r>
               <a:rPr lang="en-CH" sz="800" dirty="0"/>
-              <a:t>9. Return response</a:t>
+              <a:t>. Return response</a:t>
             </a:r>
           </a:p>
         </p:txBody>
@@ -14869,30 +14434,176 @@
           <a:p>
             <a:r>
               <a:rPr lang="en-US" sz="800" dirty="0"/>
-              <a:t>10) Validate enclave endorsement</a:t>
+              <a:t>12. Re-Perform read/write ops</a:t>
             </a:r>
           </a:p>
           <a:p>
             <a:r>
               <a:rPr lang="en-US" sz="800" dirty="0"/>
-              <a:t>11) Re-Perform read/write ops</a:t>
-            </a:r>
-          </a:p>
-          <a:p>
-            <a:r>
-              <a:rPr lang="en-US" sz="800" dirty="0"/>
-              <a:t>12) Return response</a:t>
-            </a:r>
-            <a:endParaRPr lang="en-CH" sz="800" dirty="0"/>
+              <a:t>13. Validate enclave endorsement</a:t>
+            </a:r>
           </a:p>
         </p:txBody>
       </p:sp>
       <p:sp>
         <p:nvSpPr>
-          <p:cNvPr id="56" name="Rounded Rectangular Callout 55">
+          <p:cNvPr id="54" name="Rectangle 53">
             <a:extLst>
               <a:ext uri="{FF2B5EF4-FFF2-40B4-BE49-F238E27FC236}">
-                <a16:creationId xmlns:a16="http://schemas.microsoft.com/office/drawing/2014/main" id="{F6C2BAB8-43FA-0B49-8FAB-4B2CFC001080}"/>
+                <a16:creationId xmlns:a16="http://schemas.microsoft.com/office/drawing/2014/main" id="{B5391B2B-64AD-4E07-BD07-A4477CB1077D}"/>
+              </a:ext>
+            </a:extLst>
+          </p:cNvPr>
+          <p:cNvSpPr/>
+          <p:nvPr/>
+        </p:nvSpPr>
+        <p:spPr>
+          <a:xfrm>
+            <a:off x="4426751" y="2468170"/>
+            <a:ext cx="795910" cy="1145204"/>
+          </a:xfrm>
+          <a:prstGeom prst="rect">
+            <a:avLst/>
+          </a:prstGeom>
+          <a:solidFill>
+            <a:schemeClr val="bg2"/>
+          </a:solidFill>
+          <a:ln w="25400"/>
+          <a:effectLst>
+            <a:outerShdw blurRad="50800" dist="38100" dir="2700000" algn="tl" rotWithShape="0">
+              <a:prstClr val="black">
+                <a:alpha val="40000"/>
+              </a:prstClr>
+            </a:outerShdw>
+          </a:effectLst>
+        </p:spPr>
+        <p:style>
+          <a:lnRef idx="3">
+            <a:schemeClr val="lt1"/>
+          </a:lnRef>
+          <a:fillRef idx="1">
+            <a:schemeClr val="dk1"/>
+          </a:fillRef>
+          <a:effectRef idx="1">
+            <a:schemeClr val="dk1"/>
+          </a:effectRef>
+          <a:fontRef idx="minor">
+            <a:schemeClr val="lt1"/>
+          </a:fontRef>
+        </p:style>
+        <p:txBody>
+          <a:bodyPr rot="0" spcFirstLastPara="0" vertOverflow="overflow" horzOverflow="overflow" vert="horz" wrap="square" lIns="72000" tIns="72000" rIns="68580" bIns="34290" numCol="1" spcCol="0" rtlCol="0" fromWordArt="0" anchor="ctr" anchorCtr="0" forceAA="0" compatLnSpc="1">
+            <a:prstTxWarp prst="textNoShape">
+              <a:avLst/>
+            </a:prstTxWarp>
+            <a:noAutofit/>
+          </a:bodyPr>
+          <a:lstStyle/>
+          <a:p>
+            <a:pPr algn="ctr"/>
+            <a:r>
+              <a:rPr lang="en-US" sz="800" dirty="0"/>
+              <a:t>Shim</a:t>
+            </a:r>
+          </a:p>
+        </p:txBody>
+      </p:sp>
+      <p:cxnSp>
+        <p:nvCxnSpPr>
+          <p:cNvPr id="66" name="Straight Arrow Connector 65">
+            <a:extLst>
+              <a:ext uri="{FF2B5EF4-FFF2-40B4-BE49-F238E27FC236}">
+                <a16:creationId xmlns:a16="http://schemas.microsoft.com/office/drawing/2014/main" id="{4CE8574C-AAAB-40E8-ACAC-177A07E89606}"/>
+              </a:ext>
+            </a:extLst>
+          </p:cNvPr>
+          <p:cNvCxnSpPr>
+            <a:cxnSpLocks/>
+          </p:cNvCxnSpPr>
+          <p:nvPr/>
+        </p:nvCxnSpPr>
+        <p:spPr bwMode="auto">
+          <a:xfrm flipV="1">
+            <a:off x="5222661" y="2626710"/>
+            <a:ext cx="296219" cy="10389"/>
+          </a:xfrm>
+          <a:prstGeom prst="straightConnector1">
+            <a:avLst/>
+          </a:prstGeom>
+          <a:ln w="31750">
+            <a:solidFill>
+              <a:srgbClr val="FFC000"/>
+            </a:solidFill>
+            <a:headEnd type="triangle" w="med" len="med"/>
+            <a:tailEnd type="triangle"/>
+          </a:ln>
+        </p:spPr>
+        <p:style>
+          <a:lnRef idx="1">
+            <a:schemeClr val="accent4"/>
+          </a:lnRef>
+          <a:fillRef idx="0">
+            <a:schemeClr val="accent4"/>
+          </a:fillRef>
+          <a:effectRef idx="0">
+            <a:schemeClr val="accent4"/>
+          </a:effectRef>
+          <a:fontRef idx="minor">
+            <a:schemeClr val="tx1"/>
+          </a:fontRef>
+        </p:style>
+      </p:cxnSp>
+      <p:cxnSp>
+        <p:nvCxnSpPr>
+          <p:cNvPr id="71" name="Straight Arrow Connector 70">
+            <a:extLst>
+              <a:ext uri="{FF2B5EF4-FFF2-40B4-BE49-F238E27FC236}">
+                <a16:creationId xmlns:a16="http://schemas.microsoft.com/office/drawing/2014/main" id="{50D7A76E-2405-406F-807B-A9B13F3D49EF}"/>
+              </a:ext>
+            </a:extLst>
+          </p:cNvPr>
+          <p:cNvCxnSpPr>
+            <a:cxnSpLocks/>
+          </p:cNvCxnSpPr>
+          <p:nvPr/>
+        </p:nvCxnSpPr>
+        <p:spPr bwMode="auto">
+          <a:xfrm>
+            <a:off x="5229824" y="3455474"/>
+            <a:ext cx="296219" cy="151"/>
+          </a:xfrm>
+          <a:prstGeom prst="straightConnector1">
+            <a:avLst/>
+          </a:prstGeom>
+          <a:ln w="31750">
+            <a:solidFill>
+              <a:srgbClr val="FFC000"/>
+            </a:solidFill>
+            <a:headEnd type="triangle" w="med" len="med"/>
+            <a:tailEnd type="triangle"/>
+          </a:ln>
+        </p:spPr>
+        <p:style>
+          <a:lnRef idx="1">
+            <a:schemeClr val="accent4"/>
+          </a:lnRef>
+          <a:fillRef idx="0">
+            <a:schemeClr val="accent4"/>
+          </a:fillRef>
+          <a:effectRef idx="0">
+            <a:schemeClr val="accent4"/>
+          </a:effectRef>
+          <a:fontRef idx="minor">
+            <a:schemeClr val="tx1"/>
+          </a:fontRef>
+        </p:style>
+      </p:cxnSp>
+      <p:sp>
+        <p:nvSpPr>
+          <p:cNvPr id="75" name="Rounded Rectangular Callout 55">
+            <a:extLst>
+              <a:ext uri="{FF2B5EF4-FFF2-40B4-BE49-F238E27FC236}">
+                <a16:creationId xmlns:a16="http://schemas.microsoft.com/office/drawing/2014/main" id="{F7D29329-1D4B-4A85-9BCF-1A50FC89F9CF}"/>
               </a:ext>
             </a:extLst>
           </p:cNvPr>
@@ -14901,13 +14612,13 @@
         </p:nvSpPr>
         <p:spPr bwMode="auto">
           <a:xfrm>
-            <a:off x="3590771" y="3645007"/>
-            <a:ext cx="1488366" cy="254978"/>
+            <a:off x="3648402" y="3692128"/>
+            <a:ext cx="1488366" cy="363793"/>
           </a:xfrm>
           <a:prstGeom prst="wedgeRoundRectCallout">
             <a:avLst>
               <a:gd name="adj1" fmla="val -53025"/>
-              <a:gd name="adj2" fmla="val -180877"/>
+              <a:gd name="adj2" fmla="val -147435"/>
               <a:gd name="adj3" fmla="val 16667"/>
             </a:avLst>
           </a:prstGeom>
@@ -14947,13 +14658,114 @@
           <a:lstStyle/>
           <a:p>
             <a:r>
+              <a:rPr lang="en-US" sz="800" dirty="0">
+                <a:solidFill>
+                  <a:schemeClr val="tx1"/>
+                </a:solidFill>
+              </a:rPr>
+              <a:t>14. Submit to Ordering svc</a:t>
+            </a:r>
+          </a:p>
+          <a:p>
+            <a:r>
+              <a:rPr lang="en-US" sz="800" dirty="0">
+                <a:solidFill>
+                  <a:schemeClr val="tx1"/>
+                </a:solidFill>
+              </a:rPr>
+              <a:t>15. Decrypt &amp; return response</a:t>
+            </a:r>
+          </a:p>
+        </p:txBody>
+      </p:sp>
+      <p:sp>
+        <p:nvSpPr>
+          <p:cNvPr id="56" name="Rounded Rectangular Callout 55">
+            <a:extLst>
+              <a:ext uri="{FF2B5EF4-FFF2-40B4-BE49-F238E27FC236}">
+                <a16:creationId xmlns:a16="http://schemas.microsoft.com/office/drawing/2014/main" id="{F6C2BAB8-43FA-0B49-8FAB-4B2CFC001080}"/>
+              </a:ext>
+            </a:extLst>
+          </p:cNvPr>
+          <p:cNvSpPr/>
+          <p:nvPr/>
+        </p:nvSpPr>
+        <p:spPr bwMode="auto">
+          <a:xfrm>
+            <a:off x="3655030" y="3335635"/>
+            <a:ext cx="1488366" cy="215607"/>
+          </a:xfrm>
+          <a:prstGeom prst="wedgeRoundRectCallout">
+            <a:avLst>
+              <a:gd name="adj1" fmla="val -51179"/>
+              <a:gd name="adj2" fmla="val -73486"/>
+              <a:gd name="adj3" fmla="val 16667"/>
+            </a:avLst>
+          </a:prstGeom>
+          <a:solidFill>
+            <a:schemeClr val="lt1">
+              <a:alpha val="95000"/>
+            </a:schemeClr>
+          </a:solidFill>
+          <a:ln w="12700">
+            <a:solidFill>
+              <a:schemeClr val="accent1"/>
+            </a:solidFill>
+            <a:headEnd type="none" w="med" len="med"/>
+            <a:tailEnd type="none" w="med" len="med"/>
+          </a:ln>
+        </p:spPr>
+        <p:style>
+          <a:lnRef idx="2">
+            <a:schemeClr val="accent1"/>
+          </a:lnRef>
+          <a:fillRef idx="1">
+            <a:schemeClr val="lt1"/>
+          </a:fillRef>
+          <a:effectRef idx="0">
+            <a:schemeClr val="accent1"/>
+          </a:effectRef>
+          <a:fontRef idx="minor">
+            <a:schemeClr val="dk1"/>
+          </a:fontRef>
+        </p:style>
+        <p:txBody>
+          <a:bodyPr vert="horz" wrap="square" lIns="36000" tIns="36000" rIns="36000" bIns="36000" numCol="1" rtlCol="0" anchor="ctr" anchorCtr="0" compatLnSpc="1">
+            <a:prstTxWarp prst="textNoShape">
+              <a:avLst/>
+            </a:prstTxWarp>
+          </a:bodyPr>
+          <a:lstStyle/>
+          <a:p>
+            <a:r>
               <a:rPr lang="en-CH" sz="800" dirty="0">
                 <a:solidFill>
                   <a:schemeClr val="tx1"/>
                 </a:solidFill>
               </a:rPr>
-              <a:t>10. “Invoke” endorse(reponse)</a:t>
-            </a:r>
+              <a:t>1</a:t>
+            </a:r>
+            <a:r>
+              <a:rPr lang="en-US" sz="800" dirty="0">
+                <a:solidFill>
+                  <a:schemeClr val="tx1"/>
+                </a:solidFill>
+              </a:rPr>
+              <a:t>1</a:t>
+            </a:r>
+            <a:r>
+              <a:rPr lang="en-CH" sz="800" dirty="0">
+                <a:solidFill>
+                  <a:schemeClr val="tx1"/>
+                </a:solidFill>
+              </a:rPr>
+              <a:t>. “Invoke” endorse(reponse)</a:t>
+            </a:r>
+            <a:endParaRPr lang="en-US" sz="800" dirty="0">
+              <a:solidFill>
+                <a:schemeClr val="tx1"/>
+              </a:solidFill>
+            </a:endParaRPr>
           </a:p>
         </p:txBody>
       </p:sp>

</xml_diff>

<commit_message>
updates on architecture (#29)
* updates on architecture

Signed-off-by: Marcus Brandenburger <bur@zurich.ibm.com>
Co-authored-by: Michael Steiner <michael.steiner@intel.com>
</commit_message>
<xml_diff>
--- a/images/fpc/high-level/hl-diagrams.pptx
+++ b/images/fpc/high-level/hl-diagrams.pptx
@@ -272,7 +272,7 @@
             <a:fld id="{B39099E1-2F6C-1143-9DF8-8ECBCD01D041}" type="datetimeFigureOut">
               <a:rPr lang="en-US" smtClean="0"/>
               <a:pPr/>
-              <a:t>2020-11-18</a:t>
+              <a:t>11/19/20</a:t>
             </a:fld>
             <a:endParaRPr lang="en-US"/>
           </a:p>
@@ -6450,7 +6450,7 @@
               <a:pPr algn="ctr"/>
               <a:r>
                 <a:rPr lang="en-US" sz="800" dirty="0"/>
-                <a:t>Shim</a:t>
+                <a:t>FPC Shim</a:t>
               </a:r>
             </a:p>
           </p:txBody>
@@ -7974,7 +7974,7 @@
             <a:pPr algn="ctr"/>
             <a:r>
               <a:rPr lang="en-US" sz="800" dirty="0"/>
-              <a:t>Enclave Registration Chaincode</a:t>
+              <a:t>Enclave Registry Chaincode</a:t>
             </a:r>
           </a:p>
         </p:txBody>
@@ -9893,7 +9893,7 @@
             <a:pPr algn="ctr"/>
             <a:r>
               <a:rPr lang="en-US" sz="800" dirty="0"/>
-              <a:t>Enclave Registration Chaincode</a:t>
+              <a:t>Enclave Registry Chaincode</a:t>
             </a:r>
           </a:p>
         </p:txBody>
@@ -12575,7 +12575,10 @@
             <a:avLst/>
           </a:prstGeom>
           <a:solidFill>
-            <a:schemeClr val="bg2"/>
+            <a:schemeClr val="tx1">
+              <a:lumMod val="60000"/>
+              <a:lumOff val="40000"/>
+            </a:schemeClr>
           </a:solidFill>
           <a:ln w="25400"/>
           <a:effectLst>
@@ -12612,7 +12615,7 @@
             <a:pPr algn="ctr"/>
             <a:r>
               <a:rPr lang="en-US" sz="800" dirty="0"/>
-              <a:t>Enclave Registration Chaincode</a:t>
+              <a:t>Enclave Registry Chaincode</a:t>
             </a:r>
           </a:p>
         </p:txBody>

</xml_diff>

<commit_message>
Updates based on Dave's comments
Signed-off-by: Marcus Brandenburger <bur@zurich.ibm.com>
Co-authored-by: Bruno Vavala <bruno.vavala@intel.com>
</commit_message>
<xml_diff>
--- a/images/fpc/high-level/hl-diagrams.pptx
+++ b/images/fpc/high-level/hl-diagrams.pptx
@@ -272,7 +272,7 @@
             <a:fld id="{B39099E1-2F6C-1143-9DF8-8ECBCD01D041}" type="datetimeFigureOut">
               <a:rPr lang="en-US" smtClean="0"/>
               <a:pPr/>
-              <a:t>11/19/20</a:t>
+              <a:t>1/12/21</a:t>
             </a:fld>
             <a:endParaRPr lang="en-US"/>
           </a:p>
@@ -11573,7 +11573,7 @@
                   <a:schemeClr val="tx1"/>
                 </a:solidFill>
               </a:rPr>
-              <a:t>Consortium aggres on CC Def</a:t>
+              <a:t>Consortium agrees on CC Def</a:t>
             </a:r>
             <a:endParaRPr lang="en-US" sz="800" dirty="0">
               <a:solidFill>
@@ -12024,12 +12024,20 @@
           <a:lstStyle/>
           <a:p>
             <a:r>
+              <a:rPr lang="en-CH" sz="800">
+                <a:solidFill>
+                  <a:schemeClr val="tx1"/>
+                </a:solidFill>
+              </a:rPr>
+              <a:t>13. </a:t>
+            </a:r>
+            <a:r>
               <a:rPr lang="en-CH" sz="800" dirty="0">
                 <a:solidFill>
                   <a:schemeClr val="tx1"/>
                 </a:solidFill>
               </a:rPr>
-              <a:t>12. Submit registerEnclave tx for ordering</a:t>
+              <a:t>Submit registerEnclave tx for ordering</a:t>
             </a:r>
           </a:p>
         </p:txBody>

</xml_diff>